<commit_message>
Added description of deconstruction algorithm
</commit_message>
<xml_diff>
--- a/assembly/pictures/pdf/DeconstructionOrderMattersSlide.pptx
+++ b/assembly/pictures/pdf/DeconstructionOrderMattersSlide.pptx
@@ -4,17 +4,20 @@
   <p:sldMasterIdLst>
     <p:sldMasterId id="2147483648" r:id="rId1"/>
   </p:sldMasterIdLst>
+  <p:notesMasterIdLst>
+    <p:notesMasterId r:id="rId3"/>
+  </p:notesMasterIdLst>
   <p:sldIdLst>
     <p:sldId id="256" r:id="rId2"/>
   </p:sldIdLst>
-  <p:sldSz cx="9144000" cy="6858000" type="screen4x3"/>
+  <p:sldSz cx="8961438" cy="4114800"/>
   <p:notesSz cx="6858000" cy="9144000"/>
   <p:defaultTextStyle>
     <a:defPPr>
       <a:defRPr lang="en-US"/>
     </a:defPPr>
-    <a:lvl1pPr marL="0" algn="l" defTabSz="457200" rtl="0" eaLnBrk="1" latinLnBrk="0" hangingPunct="1">
-      <a:defRPr sz="1800" kern="1200">
+    <a:lvl1pPr marL="0" algn="l" defTabSz="386654" rtl="0" eaLnBrk="1" latinLnBrk="0" hangingPunct="1">
+      <a:defRPr sz="1500" kern="1200">
         <a:solidFill>
           <a:schemeClr val="tx1"/>
         </a:solidFill>
@@ -23,8 +26,8 @@
         <a:cs typeface="+mn-cs"/>
       </a:defRPr>
     </a:lvl1pPr>
-    <a:lvl2pPr marL="457200" algn="l" defTabSz="457200" rtl="0" eaLnBrk="1" latinLnBrk="0" hangingPunct="1">
-      <a:defRPr sz="1800" kern="1200">
+    <a:lvl2pPr marL="386654" algn="l" defTabSz="386654" rtl="0" eaLnBrk="1" latinLnBrk="0" hangingPunct="1">
+      <a:defRPr sz="1500" kern="1200">
         <a:solidFill>
           <a:schemeClr val="tx1"/>
         </a:solidFill>
@@ -33,8 +36,8 @@
         <a:cs typeface="+mn-cs"/>
       </a:defRPr>
     </a:lvl2pPr>
-    <a:lvl3pPr marL="914400" algn="l" defTabSz="457200" rtl="0" eaLnBrk="1" latinLnBrk="0" hangingPunct="1">
-      <a:defRPr sz="1800" kern="1200">
+    <a:lvl3pPr marL="773308" algn="l" defTabSz="386654" rtl="0" eaLnBrk="1" latinLnBrk="0" hangingPunct="1">
+      <a:defRPr sz="1500" kern="1200">
         <a:solidFill>
           <a:schemeClr val="tx1"/>
         </a:solidFill>
@@ -43,8 +46,8 @@
         <a:cs typeface="+mn-cs"/>
       </a:defRPr>
     </a:lvl3pPr>
-    <a:lvl4pPr marL="1371600" algn="l" defTabSz="457200" rtl="0" eaLnBrk="1" latinLnBrk="0" hangingPunct="1">
-      <a:defRPr sz="1800" kern="1200">
+    <a:lvl4pPr marL="1159962" algn="l" defTabSz="386654" rtl="0" eaLnBrk="1" latinLnBrk="0" hangingPunct="1">
+      <a:defRPr sz="1500" kern="1200">
         <a:solidFill>
           <a:schemeClr val="tx1"/>
         </a:solidFill>
@@ -53,8 +56,8 @@
         <a:cs typeface="+mn-cs"/>
       </a:defRPr>
     </a:lvl4pPr>
-    <a:lvl5pPr marL="1828800" algn="l" defTabSz="457200" rtl="0" eaLnBrk="1" latinLnBrk="0" hangingPunct="1">
-      <a:defRPr sz="1800" kern="1200">
+    <a:lvl5pPr marL="1546616" algn="l" defTabSz="386654" rtl="0" eaLnBrk="1" latinLnBrk="0" hangingPunct="1">
+      <a:defRPr sz="1500" kern="1200">
         <a:solidFill>
           <a:schemeClr val="tx1"/>
         </a:solidFill>
@@ -63,8 +66,8 @@
         <a:cs typeface="+mn-cs"/>
       </a:defRPr>
     </a:lvl5pPr>
-    <a:lvl6pPr marL="2286000" algn="l" defTabSz="457200" rtl="0" eaLnBrk="1" latinLnBrk="0" hangingPunct="1">
-      <a:defRPr sz="1800" kern="1200">
+    <a:lvl6pPr marL="1933270" algn="l" defTabSz="386654" rtl="0" eaLnBrk="1" latinLnBrk="0" hangingPunct="1">
+      <a:defRPr sz="1500" kern="1200">
         <a:solidFill>
           <a:schemeClr val="tx1"/>
         </a:solidFill>
@@ -73,8 +76,8 @@
         <a:cs typeface="+mn-cs"/>
       </a:defRPr>
     </a:lvl6pPr>
-    <a:lvl7pPr marL="2743200" algn="l" defTabSz="457200" rtl="0" eaLnBrk="1" latinLnBrk="0" hangingPunct="1">
-      <a:defRPr sz="1800" kern="1200">
+    <a:lvl7pPr marL="2319924" algn="l" defTabSz="386654" rtl="0" eaLnBrk="1" latinLnBrk="0" hangingPunct="1">
+      <a:defRPr sz="1500" kern="1200">
         <a:solidFill>
           <a:schemeClr val="tx1"/>
         </a:solidFill>
@@ -83,8 +86,8 @@
         <a:cs typeface="+mn-cs"/>
       </a:defRPr>
     </a:lvl7pPr>
-    <a:lvl8pPr marL="3200400" algn="l" defTabSz="457200" rtl="0" eaLnBrk="1" latinLnBrk="0" hangingPunct="1">
-      <a:defRPr sz="1800" kern="1200">
+    <a:lvl8pPr marL="2706578" algn="l" defTabSz="386654" rtl="0" eaLnBrk="1" latinLnBrk="0" hangingPunct="1">
+      <a:defRPr sz="1500" kern="1200">
         <a:solidFill>
           <a:schemeClr val="tx1"/>
         </a:solidFill>
@@ -93,8 +96,8 @@
         <a:cs typeface="+mn-cs"/>
       </a:defRPr>
     </a:lvl8pPr>
-    <a:lvl9pPr marL="3657600" algn="l" defTabSz="457200" rtl="0" eaLnBrk="1" latinLnBrk="0" hangingPunct="1">
-      <a:defRPr sz="1800" kern="1200">
+    <a:lvl9pPr marL="3093232" algn="l" defTabSz="386654" rtl="0" eaLnBrk="1" latinLnBrk="0" hangingPunct="1">
+      <a:defRPr sz="1500" kern="1200">
         <a:solidFill>
           <a:schemeClr val="tx1"/>
         </a:solidFill>
@@ -105,6 +108,478 @@
     </a:lvl9pPr>
   </p:defaultTextStyle>
 </p:presentation>
+</file>
+
+<file path=ppt/notesMasters/notesMaster1.xml><?xml version="1.0" encoding="utf-8"?>
+<p:notesMaster xmlns:a="http://schemas.openxmlformats.org/drawingml/2006/main" xmlns:r="http://schemas.openxmlformats.org/officeDocument/2006/relationships" xmlns:p="http://schemas.openxmlformats.org/presentationml/2006/main">
+  <p:cSld>
+    <p:bg>
+      <p:bgRef idx="1001">
+        <a:schemeClr val="bg1"/>
+      </p:bgRef>
+    </p:bg>
+    <p:spTree>
+      <p:nvGrpSpPr>
+        <p:cNvPr id="1" name=""/>
+        <p:cNvGrpSpPr/>
+        <p:nvPr/>
+      </p:nvGrpSpPr>
+      <p:grpSpPr>
+        <a:xfrm>
+          <a:off x="0" y="0"/>
+          <a:ext cx="0" cy="0"/>
+          <a:chOff x="0" y="0"/>
+          <a:chExt cx="0" cy="0"/>
+        </a:xfrm>
+      </p:grpSpPr>
+      <p:sp>
+        <p:nvSpPr>
+          <p:cNvPr id="2" name="Header Placeholder 1"/>
+          <p:cNvSpPr>
+            <a:spLocks noGrp="1"/>
+          </p:cNvSpPr>
+          <p:nvPr>
+            <p:ph type="hdr" sz="quarter"/>
+          </p:nvPr>
+        </p:nvSpPr>
+        <p:spPr>
+          <a:xfrm>
+            <a:off x="0" y="0"/>
+            <a:ext cx="2971800" cy="457200"/>
+          </a:xfrm>
+          <a:prstGeom prst="rect">
+            <a:avLst/>
+          </a:prstGeom>
+        </p:spPr>
+        <p:txBody>
+          <a:bodyPr vert="horz" lIns="91440" tIns="45720" rIns="91440" bIns="45720" rtlCol="0"/>
+          <a:lstStyle>
+            <a:lvl1pPr algn="l">
+              <a:defRPr sz="1200"/>
+            </a:lvl1pPr>
+          </a:lstStyle>
+          <a:p>
+            <a:endParaRPr lang="en-US"/>
+          </a:p>
+        </p:txBody>
+      </p:sp>
+      <p:sp>
+        <p:nvSpPr>
+          <p:cNvPr id="3" name="Date Placeholder 2"/>
+          <p:cNvSpPr>
+            <a:spLocks noGrp="1"/>
+          </p:cNvSpPr>
+          <p:nvPr>
+            <p:ph type="dt" idx="1"/>
+          </p:nvPr>
+        </p:nvSpPr>
+        <p:spPr>
+          <a:xfrm>
+            <a:off x="3884613" y="0"/>
+            <a:ext cx="2971800" cy="457200"/>
+          </a:xfrm>
+          <a:prstGeom prst="rect">
+            <a:avLst/>
+          </a:prstGeom>
+        </p:spPr>
+        <p:txBody>
+          <a:bodyPr vert="horz" lIns="91440" tIns="45720" rIns="91440" bIns="45720" rtlCol="0"/>
+          <a:lstStyle>
+            <a:lvl1pPr algn="r">
+              <a:defRPr sz="1200"/>
+            </a:lvl1pPr>
+          </a:lstStyle>
+          <a:p>
+            <a:fld id="{29A15232-7732-E94A-951B-2AD03E6850F8}" type="datetimeFigureOut">
+              <a:rPr lang="en-US" smtClean="0"/>
+              <a:t>2/14/17</a:t>
+            </a:fld>
+            <a:endParaRPr lang="en-US"/>
+          </a:p>
+        </p:txBody>
+      </p:sp>
+      <p:sp>
+        <p:nvSpPr>
+          <p:cNvPr id="4" name="Slide Image Placeholder 3"/>
+          <p:cNvSpPr>
+            <a:spLocks noGrp="1" noRot="1" noChangeAspect="1"/>
+          </p:cNvSpPr>
+          <p:nvPr>
+            <p:ph type="sldImg" idx="2"/>
+          </p:nvPr>
+        </p:nvSpPr>
+        <p:spPr>
+          <a:xfrm>
+            <a:off x="-304800" y="685800"/>
+            <a:ext cx="7467600" cy="3429000"/>
+          </a:xfrm>
+          <a:prstGeom prst="rect">
+            <a:avLst/>
+          </a:prstGeom>
+          <a:noFill/>
+          <a:ln w="12700">
+            <a:solidFill>
+              <a:prstClr val="black"/>
+            </a:solidFill>
+          </a:ln>
+        </p:spPr>
+        <p:txBody>
+          <a:bodyPr vert="horz" lIns="91440" tIns="45720" rIns="91440" bIns="45720" rtlCol="0" anchor="ctr"/>
+          <a:lstStyle/>
+          <a:p>
+            <a:endParaRPr lang="en-US"/>
+          </a:p>
+        </p:txBody>
+      </p:sp>
+      <p:sp>
+        <p:nvSpPr>
+          <p:cNvPr id="5" name="Notes Placeholder 4"/>
+          <p:cNvSpPr>
+            <a:spLocks noGrp="1"/>
+          </p:cNvSpPr>
+          <p:nvPr>
+            <p:ph type="body" sz="quarter" idx="3"/>
+          </p:nvPr>
+        </p:nvSpPr>
+        <p:spPr>
+          <a:xfrm>
+            <a:off x="685800" y="4343400"/>
+            <a:ext cx="5486400" cy="4114800"/>
+          </a:xfrm>
+          <a:prstGeom prst="rect">
+            <a:avLst/>
+          </a:prstGeom>
+        </p:spPr>
+        <p:txBody>
+          <a:bodyPr vert="horz" lIns="91440" tIns="45720" rIns="91440" bIns="45720" rtlCol="0"/>
+          <a:lstStyle/>
+          <a:p>
+            <a:pPr lvl="0"/>
+            <a:r>
+              <a:rPr lang="en-US" smtClean="0"/>
+              <a:t>Click to edit Master text styles</a:t>
+            </a:r>
+          </a:p>
+          <a:p>
+            <a:pPr lvl="1"/>
+            <a:r>
+              <a:rPr lang="en-US" smtClean="0"/>
+              <a:t>Second level</a:t>
+            </a:r>
+          </a:p>
+          <a:p>
+            <a:pPr lvl="2"/>
+            <a:r>
+              <a:rPr lang="en-US" smtClean="0"/>
+              <a:t>Third level</a:t>
+            </a:r>
+          </a:p>
+          <a:p>
+            <a:pPr lvl="3"/>
+            <a:r>
+              <a:rPr lang="en-US" smtClean="0"/>
+              <a:t>Fourth level</a:t>
+            </a:r>
+          </a:p>
+          <a:p>
+            <a:pPr lvl="4"/>
+            <a:r>
+              <a:rPr lang="en-US" smtClean="0"/>
+              <a:t>Fifth level</a:t>
+            </a:r>
+            <a:endParaRPr lang="en-US"/>
+          </a:p>
+        </p:txBody>
+      </p:sp>
+      <p:sp>
+        <p:nvSpPr>
+          <p:cNvPr id="6" name="Footer Placeholder 5"/>
+          <p:cNvSpPr>
+            <a:spLocks noGrp="1"/>
+          </p:cNvSpPr>
+          <p:nvPr>
+            <p:ph type="ftr" sz="quarter" idx="4"/>
+          </p:nvPr>
+        </p:nvSpPr>
+        <p:spPr>
+          <a:xfrm>
+            <a:off x="0" y="8685213"/>
+            <a:ext cx="2971800" cy="457200"/>
+          </a:xfrm>
+          <a:prstGeom prst="rect">
+            <a:avLst/>
+          </a:prstGeom>
+        </p:spPr>
+        <p:txBody>
+          <a:bodyPr vert="horz" lIns="91440" tIns="45720" rIns="91440" bIns="45720" rtlCol="0" anchor="b"/>
+          <a:lstStyle>
+            <a:lvl1pPr algn="l">
+              <a:defRPr sz="1200"/>
+            </a:lvl1pPr>
+          </a:lstStyle>
+          <a:p>
+            <a:endParaRPr lang="en-US"/>
+          </a:p>
+        </p:txBody>
+      </p:sp>
+      <p:sp>
+        <p:nvSpPr>
+          <p:cNvPr id="7" name="Slide Number Placeholder 6"/>
+          <p:cNvSpPr>
+            <a:spLocks noGrp="1"/>
+          </p:cNvSpPr>
+          <p:nvPr>
+            <p:ph type="sldNum" sz="quarter" idx="5"/>
+          </p:nvPr>
+        </p:nvSpPr>
+        <p:spPr>
+          <a:xfrm>
+            <a:off x="3884613" y="8685213"/>
+            <a:ext cx="2971800" cy="457200"/>
+          </a:xfrm>
+          <a:prstGeom prst="rect">
+            <a:avLst/>
+          </a:prstGeom>
+        </p:spPr>
+        <p:txBody>
+          <a:bodyPr vert="horz" lIns="91440" tIns="45720" rIns="91440" bIns="45720" rtlCol="0" anchor="b"/>
+          <a:lstStyle>
+            <a:lvl1pPr algn="r">
+              <a:defRPr sz="1200"/>
+            </a:lvl1pPr>
+          </a:lstStyle>
+          <a:p>
+            <a:fld id="{748D3D16-32D0-CD48-A958-7370189D9A93}" type="slidenum">
+              <a:rPr lang="en-US" smtClean="0"/>
+              <a:t>‹#›</a:t>
+            </a:fld>
+            <a:endParaRPr lang="en-US"/>
+          </a:p>
+        </p:txBody>
+      </p:sp>
+    </p:spTree>
+    <p:extLst>
+      <p:ext uri="{BB962C8B-B14F-4D97-AF65-F5344CB8AC3E}">
+        <p14:creationId xmlns:p14="http://schemas.microsoft.com/office/powerpoint/2010/main" val="3075608360"/>
+      </p:ext>
+    </p:extLst>
+  </p:cSld>
+  <p:clrMap bg1="lt1" tx1="dk1" bg2="lt2" tx2="dk2" accent1="accent1" accent2="accent2" accent3="accent3" accent4="accent4" accent5="accent5" accent6="accent6" hlink="hlink" folHlink="folHlink"/>
+  <p:notesStyle>
+    <a:lvl1pPr marL="0" algn="l" defTabSz="386654" rtl="0" eaLnBrk="1" latinLnBrk="0" hangingPunct="1">
+      <a:defRPr sz="1000" kern="1200">
+        <a:solidFill>
+          <a:schemeClr val="tx1"/>
+        </a:solidFill>
+        <a:latin typeface="+mn-lt"/>
+        <a:ea typeface="+mn-ea"/>
+        <a:cs typeface="+mn-cs"/>
+      </a:defRPr>
+    </a:lvl1pPr>
+    <a:lvl2pPr marL="386654" algn="l" defTabSz="386654" rtl="0" eaLnBrk="1" latinLnBrk="0" hangingPunct="1">
+      <a:defRPr sz="1000" kern="1200">
+        <a:solidFill>
+          <a:schemeClr val="tx1"/>
+        </a:solidFill>
+        <a:latin typeface="+mn-lt"/>
+        <a:ea typeface="+mn-ea"/>
+        <a:cs typeface="+mn-cs"/>
+      </a:defRPr>
+    </a:lvl2pPr>
+    <a:lvl3pPr marL="773308" algn="l" defTabSz="386654" rtl="0" eaLnBrk="1" latinLnBrk="0" hangingPunct="1">
+      <a:defRPr sz="1000" kern="1200">
+        <a:solidFill>
+          <a:schemeClr val="tx1"/>
+        </a:solidFill>
+        <a:latin typeface="+mn-lt"/>
+        <a:ea typeface="+mn-ea"/>
+        <a:cs typeface="+mn-cs"/>
+      </a:defRPr>
+    </a:lvl3pPr>
+    <a:lvl4pPr marL="1159962" algn="l" defTabSz="386654" rtl="0" eaLnBrk="1" latinLnBrk="0" hangingPunct="1">
+      <a:defRPr sz="1000" kern="1200">
+        <a:solidFill>
+          <a:schemeClr val="tx1"/>
+        </a:solidFill>
+        <a:latin typeface="+mn-lt"/>
+        <a:ea typeface="+mn-ea"/>
+        <a:cs typeface="+mn-cs"/>
+      </a:defRPr>
+    </a:lvl4pPr>
+    <a:lvl5pPr marL="1546616" algn="l" defTabSz="386654" rtl="0" eaLnBrk="1" latinLnBrk="0" hangingPunct="1">
+      <a:defRPr sz="1000" kern="1200">
+        <a:solidFill>
+          <a:schemeClr val="tx1"/>
+        </a:solidFill>
+        <a:latin typeface="+mn-lt"/>
+        <a:ea typeface="+mn-ea"/>
+        <a:cs typeface="+mn-cs"/>
+      </a:defRPr>
+    </a:lvl5pPr>
+    <a:lvl6pPr marL="1933270" algn="l" defTabSz="386654" rtl="0" eaLnBrk="1" latinLnBrk="0" hangingPunct="1">
+      <a:defRPr sz="1000" kern="1200">
+        <a:solidFill>
+          <a:schemeClr val="tx1"/>
+        </a:solidFill>
+        <a:latin typeface="+mn-lt"/>
+        <a:ea typeface="+mn-ea"/>
+        <a:cs typeface="+mn-cs"/>
+      </a:defRPr>
+    </a:lvl6pPr>
+    <a:lvl7pPr marL="2319924" algn="l" defTabSz="386654" rtl="0" eaLnBrk="1" latinLnBrk="0" hangingPunct="1">
+      <a:defRPr sz="1000" kern="1200">
+        <a:solidFill>
+          <a:schemeClr val="tx1"/>
+        </a:solidFill>
+        <a:latin typeface="+mn-lt"/>
+        <a:ea typeface="+mn-ea"/>
+        <a:cs typeface="+mn-cs"/>
+      </a:defRPr>
+    </a:lvl7pPr>
+    <a:lvl8pPr marL="2706578" algn="l" defTabSz="386654" rtl="0" eaLnBrk="1" latinLnBrk="0" hangingPunct="1">
+      <a:defRPr sz="1000" kern="1200">
+        <a:solidFill>
+          <a:schemeClr val="tx1"/>
+        </a:solidFill>
+        <a:latin typeface="+mn-lt"/>
+        <a:ea typeface="+mn-ea"/>
+        <a:cs typeface="+mn-cs"/>
+      </a:defRPr>
+    </a:lvl8pPr>
+    <a:lvl9pPr marL="3093232" algn="l" defTabSz="386654" rtl="0" eaLnBrk="1" latinLnBrk="0" hangingPunct="1">
+      <a:defRPr sz="1000" kern="1200">
+        <a:solidFill>
+          <a:schemeClr val="tx1"/>
+        </a:solidFill>
+        <a:latin typeface="+mn-lt"/>
+        <a:ea typeface="+mn-ea"/>
+        <a:cs typeface="+mn-cs"/>
+      </a:defRPr>
+    </a:lvl9pPr>
+  </p:notesStyle>
+</p:notesMaster>
+</file>
+
+<file path=ppt/notesSlides/notesSlide1.xml><?xml version="1.0" encoding="utf-8"?>
+<p:notes xmlns:a="http://schemas.openxmlformats.org/drawingml/2006/main" xmlns:r="http://schemas.openxmlformats.org/officeDocument/2006/relationships" xmlns:p="http://schemas.openxmlformats.org/presentationml/2006/main">
+  <p:cSld>
+    <p:spTree>
+      <p:nvGrpSpPr>
+        <p:cNvPr id="1" name=""/>
+        <p:cNvGrpSpPr/>
+        <p:nvPr/>
+      </p:nvGrpSpPr>
+      <p:grpSpPr>
+        <a:xfrm>
+          <a:off x="0" y="0"/>
+          <a:ext cx="0" cy="0"/>
+          <a:chOff x="0" y="0"/>
+          <a:chExt cx="0" cy="0"/>
+        </a:xfrm>
+      </p:grpSpPr>
+      <p:sp>
+        <p:nvSpPr>
+          <p:cNvPr id="2" name="Slide Image Placeholder 1"/>
+          <p:cNvSpPr>
+            <a:spLocks noGrp="1" noRot="1" noChangeAspect="1"/>
+          </p:cNvSpPr>
+          <p:nvPr>
+            <p:ph type="sldImg"/>
+          </p:nvPr>
+        </p:nvSpPr>
+        <p:spPr>
+          <a:xfrm>
+            <a:off x="-304800" y="685800"/>
+            <a:ext cx="7467600" cy="3429000"/>
+          </a:xfrm>
+        </p:spPr>
+      </p:sp>
+      <p:sp>
+        <p:nvSpPr>
+          <p:cNvPr id="3" name="Notes Placeholder 2"/>
+          <p:cNvSpPr>
+            <a:spLocks noGrp="1"/>
+          </p:cNvSpPr>
+          <p:nvPr>
+            <p:ph type="body" idx="1"/>
+          </p:nvPr>
+        </p:nvSpPr>
+        <p:spPr/>
+        <p:txBody>
+          <a:bodyPr/>
+          <a:lstStyle/>
+          <a:p>
+            <a:pPr marL="0" marR="0" indent="0" algn="l" defTabSz="457200" rtl="0" eaLnBrk="1" fontAlgn="auto" latinLnBrk="0" hangingPunct="1">
+              <a:lnSpc>
+                <a:spcPct val="100000"/>
+              </a:lnSpc>
+              <a:spcBef>
+                <a:spcPts val="0"/>
+              </a:spcBef>
+              <a:spcAft>
+                <a:spcPts val="0"/>
+              </a:spcAft>
+              <a:buClrTx/>
+              <a:buSzTx/>
+              <a:buFontTx/>
+              <a:buNone/>
+              <a:tabLst/>
+              <a:defRPr/>
+            </a:pPr>
+            <a:r>
+              <a:rPr lang="en-US" dirty="0" smtClean="0">
+                <a:latin typeface="Times New Roman"/>
+                <a:cs typeface="Times New Roman"/>
+              </a:rPr>
+              <a:t>Deconstruction order matters. In the top row, the green tile is removed first, resulting in a polyomino that cannot be decomposed. </a:t>
+            </a:r>
+            <a:r>
+              <a:rPr lang="en-US" smtClean="0">
+                <a:latin typeface="Times New Roman"/>
+                <a:cs typeface="Times New Roman"/>
+              </a:rPr>
+              <a:t>However, if the bottom right tile is removed first, deconstruction is possible</a:t>
+            </a:r>
+          </a:p>
+          <a:p>
+            <a:endParaRPr lang="en-US"/>
+          </a:p>
+        </p:txBody>
+      </p:sp>
+      <p:sp>
+        <p:nvSpPr>
+          <p:cNvPr id="4" name="Slide Number Placeholder 3"/>
+          <p:cNvSpPr>
+            <a:spLocks noGrp="1"/>
+          </p:cNvSpPr>
+          <p:nvPr>
+            <p:ph type="sldNum" sz="quarter" idx="10"/>
+          </p:nvPr>
+        </p:nvSpPr>
+        <p:spPr/>
+        <p:txBody>
+          <a:bodyPr/>
+          <a:lstStyle/>
+          <a:p>
+            <a:fld id="{748D3D16-32D0-CD48-A958-7370189D9A93}" type="slidenum">
+              <a:rPr lang="en-US" smtClean="0"/>
+              <a:t>1</a:t>
+            </a:fld>
+            <a:endParaRPr lang="en-US"/>
+          </a:p>
+        </p:txBody>
+      </p:sp>
+    </p:spTree>
+    <p:extLst>
+      <p:ext uri="{BB962C8B-B14F-4D97-AF65-F5344CB8AC3E}">
+        <p14:creationId xmlns:p14="http://schemas.microsoft.com/office/powerpoint/2010/main" val="19670785"/>
+      </p:ext>
+    </p:extLst>
+  </p:cSld>
+  <p:clrMapOvr>
+    <a:masterClrMapping/>
+  </p:clrMapOvr>
+</p:notes>
 </file>
 
 <file path=ppt/slideLayouts/slideLayout1.xml><?xml version="1.0" encoding="utf-8"?>
@@ -136,8 +611,8 @@
         </p:nvSpPr>
         <p:spPr>
           <a:xfrm>
-            <a:off x="685800" y="2130425"/>
-            <a:ext cx="7772400" cy="1470025"/>
+            <a:off x="672108" y="1278256"/>
+            <a:ext cx="7617222" cy="882015"/>
           </a:xfrm>
         </p:spPr>
         <p:txBody>
@@ -164,8 +639,8 @@
         </p:nvSpPr>
         <p:spPr>
           <a:xfrm>
-            <a:off x="1371600" y="3886200"/>
-            <a:ext cx="6400800" cy="1752600"/>
+            <a:off x="1344217" y="2331720"/>
+            <a:ext cx="6273007" cy="1051560"/>
           </a:xfrm>
         </p:spPr>
         <p:txBody>
@@ -181,7 +656,7 @@
                 </a:solidFill>
               </a:defRPr>
             </a:lvl1pPr>
-            <a:lvl2pPr marL="457200" indent="0" algn="ctr">
+            <a:lvl2pPr marL="386654" indent="0" algn="ctr">
               <a:buNone/>
               <a:defRPr>
                 <a:solidFill>
@@ -191,7 +666,7 @@
                 </a:solidFill>
               </a:defRPr>
             </a:lvl2pPr>
-            <a:lvl3pPr marL="914400" indent="0" algn="ctr">
+            <a:lvl3pPr marL="773308" indent="0" algn="ctr">
               <a:buNone/>
               <a:defRPr>
                 <a:solidFill>
@@ -201,7 +676,7 @@
                 </a:solidFill>
               </a:defRPr>
             </a:lvl3pPr>
-            <a:lvl4pPr marL="1371600" indent="0" algn="ctr">
+            <a:lvl4pPr marL="1159962" indent="0" algn="ctr">
               <a:buNone/>
               <a:defRPr>
                 <a:solidFill>
@@ -211,7 +686,7 @@
                 </a:solidFill>
               </a:defRPr>
             </a:lvl4pPr>
-            <a:lvl5pPr marL="1828800" indent="0" algn="ctr">
+            <a:lvl5pPr marL="1546616" indent="0" algn="ctr">
               <a:buNone/>
               <a:defRPr>
                 <a:solidFill>
@@ -221,7 +696,7 @@
                 </a:solidFill>
               </a:defRPr>
             </a:lvl5pPr>
-            <a:lvl6pPr marL="2286000" indent="0" algn="ctr">
+            <a:lvl6pPr marL="1933270" indent="0" algn="ctr">
               <a:buNone/>
               <a:defRPr>
                 <a:solidFill>
@@ -231,7 +706,7 @@
                 </a:solidFill>
               </a:defRPr>
             </a:lvl6pPr>
-            <a:lvl7pPr marL="2743200" indent="0" algn="ctr">
+            <a:lvl7pPr marL="2319924" indent="0" algn="ctr">
               <a:buNone/>
               <a:defRPr>
                 <a:solidFill>
@@ -241,7 +716,7 @@
                 </a:solidFill>
               </a:defRPr>
             </a:lvl7pPr>
-            <a:lvl8pPr marL="3200400" indent="0" algn="ctr">
+            <a:lvl8pPr marL="2706578" indent="0" algn="ctr">
               <a:buNone/>
               <a:defRPr>
                 <a:solidFill>
@@ -251,7 +726,7 @@
                 </a:solidFill>
               </a:defRPr>
             </a:lvl8pPr>
-            <a:lvl9pPr marL="3657600" indent="0" algn="ctr">
+            <a:lvl9pPr marL="3093232" indent="0" algn="ctr">
               <a:buNone/>
               <a:defRPr>
                 <a:solidFill>
@@ -288,7 +763,7 @@
           <a:p>
             <a:fld id="{7043EB36-D168-6042-B445-1E6BEF1C6D80}" type="datetimeFigureOut">
               <a:rPr lang="en-US" smtClean="0"/>
-              <a:t>2/11/17</a:t>
+              <a:t>2/14/17</a:t>
             </a:fld>
             <a:endParaRPr lang="en-US"/>
           </a:p>
@@ -458,7 +933,7 @@
           <a:p>
             <a:fld id="{7043EB36-D168-6042-B445-1E6BEF1C6D80}" type="datetimeFigureOut">
               <a:rPr lang="en-US" smtClean="0"/>
-              <a:t>2/11/17</a:t>
+              <a:t>2/14/17</a:t>
             </a:fld>
             <a:endParaRPr lang="en-US"/>
           </a:p>
@@ -548,8 +1023,8 @@
         </p:nvSpPr>
         <p:spPr>
           <a:xfrm>
-            <a:off x="6629400" y="274638"/>
-            <a:ext cx="2057400" cy="5851525"/>
+            <a:off x="6497042" y="164783"/>
+            <a:ext cx="2016324" cy="3510915"/>
           </a:xfrm>
         </p:spPr>
         <p:txBody>
@@ -576,8 +1051,8 @@
         </p:nvSpPr>
         <p:spPr>
           <a:xfrm>
-            <a:off x="457200" y="274638"/>
-            <a:ext cx="6019800" cy="5851525"/>
+            <a:off x="448073" y="164783"/>
+            <a:ext cx="5899613" cy="3510915"/>
           </a:xfrm>
         </p:spPr>
         <p:txBody>
@@ -638,7 +1113,7 @@
           <a:p>
             <a:fld id="{7043EB36-D168-6042-B445-1E6BEF1C6D80}" type="datetimeFigureOut">
               <a:rPr lang="en-US" smtClean="0"/>
-              <a:t>2/11/17</a:t>
+              <a:t>2/14/17</a:t>
             </a:fld>
             <a:endParaRPr lang="en-US"/>
           </a:p>
@@ -808,7 +1283,7 @@
           <a:p>
             <a:fld id="{7043EB36-D168-6042-B445-1E6BEF1C6D80}" type="datetimeFigureOut">
               <a:rPr lang="en-US" smtClean="0"/>
-              <a:t>2/11/17</a:t>
+              <a:t>2/14/17</a:t>
             </a:fld>
             <a:endParaRPr lang="en-US"/>
           </a:p>
@@ -898,15 +1373,15 @@
         </p:nvSpPr>
         <p:spPr>
           <a:xfrm>
-            <a:off x="722313" y="4406900"/>
-            <a:ext cx="7772400" cy="1362075"/>
+            <a:off x="707892" y="2644141"/>
+            <a:ext cx="7617222" cy="817245"/>
           </a:xfrm>
         </p:spPr>
         <p:txBody>
           <a:bodyPr anchor="t"/>
           <a:lstStyle>
             <a:lvl1pPr algn="l">
-              <a:defRPr sz="4000" b="1" cap="all"/>
+              <a:defRPr sz="3400" b="1" cap="all"/>
             </a:lvl1pPr>
           </a:lstStyle>
           <a:p>
@@ -930,8 +1405,8 @@
         </p:nvSpPr>
         <p:spPr>
           <a:xfrm>
-            <a:off x="722313" y="2906713"/>
-            <a:ext cx="7772400" cy="1500187"/>
+            <a:off x="707892" y="1744028"/>
+            <a:ext cx="7617222" cy="900113"/>
           </a:xfrm>
         </p:spPr>
         <p:txBody>
@@ -939,7 +1414,7 @@
           <a:lstStyle>
             <a:lvl1pPr marL="0" indent="0">
               <a:buNone/>
-              <a:defRPr sz="2000">
+              <a:defRPr sz="1700">
                 <a:solidFill>
                   <a:schemeClr val="tx1">
                     <a:tint val="75000"/>
@@ -947,9 +1422,9 @@
                 </a:solidFill>
               </a:defRPr>
             </a:lvl1pPr>
-            <a:lvl2pPr marL="457200" indent="0">
-              <a:buNone/>
-              <a:defRPr sz="1800">
+            <a:lvl2pPr marL="386654" indent="0">
+              <a:buNone/>
+              <a:defRPr sz="1500">
                 <a:solidFill>
                   <a:schemeClr val="tx1">
                     <a:tint val="75000"/>
@@ -957,9 +1432,9 @@
                 </a:solidFill>
               </a:defRPr>
             </a:lvl2pPr>
-            <a:lvl3pPr marL="914400" indent="0">
-              <a:buNone/>
-              <a:defRPr sz="1600">
+            <a:lvl3pPr marL="773308" indent="0">
+              <a:buNone/>
+              <a:defRPr sz="1400">
                 <a:solidFill>
                   <a:schemeClr val="tx1">
                     <a:tint val="75000"/>
@@ -967,9 +1442,9 @@
                 </a:solidFill>
               </a:defRPr>
             </a:lvl3pPr>
-            <a:lvl4pPr marL="1371600" indent="0">
-              <a:buNone/>
-              <a:defRPr sz="1400">
+            <a:lvl4pPr marL="1159962" indent="0">
+              <a:buNone/>
+              <a:defRPr sz="1200">
                 <a:solidFill>
                   <a:schemeClr val="tx1">
                     <a:tint val="75000"/>
@@ -977,9 +1452,9 @@
                 </a:solidFill>
               </a:defRPr>
             </a:lvl4pPr>
-            <a:lvl5pPr marL="1828800" indent="0">
-              <a:buNone/>
-              <a:defRPr sz="1400">
+            <a:lvl5pPr marL="1546616" indent="0">
+              <a:buNone/>
+              <a:defRPr sz="1200">
                 <a:solidFill>
                   <a:schemeClr val="tx1">
                     <a:tint val="75000"/>
@@ -987,9 +1462,9 @@
                 </a:solidFill>
               </a:defRPr>
             </a:lvl5pPr>
-            <a:lvl6pPr marL="2286000" indent="0">
-              <a:buNone/>
-              <a:defRPr sz="1400">
+            <a:lvl6pPr marL="1933270" indent="0">
+              <a:buNone/>
+              <a:defRPr sz="1200">
                 <a:solidFill>
                   <a:schemeClr val="tx1">
                     <a:tint val="75000"/>
@@ -997,9 +1472,9 @@
                 </a:solidFill>
               </a:defRPr>
             </a:lvl6pPr>
-            <a:lvl7pPr marL="2743200" indent="0">
-              <a:buNone/>
-              <a:defRPr sz="1400">
+            <a:lvl7pPr marL="2319924" indent="0">
+              <a:buNone/>
+              <a:defRPr sz="1200">
                 <a:solidFill>
                   <a:schemeClr val="tx1">
                     <a:tint val="75000"/>
@@ -1007,9 +1482,9 @@
                 </a:solidFill>
               </a:defRPr>
             </a:lvl7pPr>
-            <a:lvl8pPr marL="3200400" indent="0">
-              <a:buNone/>
-              <a:defRPr sz="1400">
+            <a:lvl8pPr marL="2706578" indent="0">
+              <a:buNone/>
+              <a:defRPr sz="1200">
                 <a:solidFill>
                   <a:schemeClr val="tx1">
                     <a:tint val="75000"/>
@@ -1017,9 +1492,9 @@
                 </a:solidFill>
               </a:defRPr>
             </a:lvl8pPr>
-            <a:lvl9pPr marL="3657600" indent="0">
-              <a:buNone/>
-              <a:defRPr sz="1400">
+            <a:lvl9pPr marL="3093232" indent="0">
+              <a:buNone/>
+              <a:defRPr sz="1200">
                 <a:solidFill>
                   <a:schemeClr val="tx1">
                     <a:tint val="75000"/>
@@ -1054,7 +1529,7 @@
           <a:p>
             <a:fld id="{7043EB36-D168-6042-B445-1E6BEF1C6D80}" type="datetimeFigureOut">
               <a:rPr lang="en-US" smtClean="0"/>
-              <a:t>2/11/17</a:t>
+              <a:t>2/14/17</a:t>
             </a:fld>
             <a:endParaRPr lang="en-US"/>
           </a:p>
@@ -1167,39 +1642,39 @@
         </p:nvSpPr>
         <p:spPr>
           <a:xfrm>
-            <a:off x="457200" y="1600200"/>
-            <a:ext cx="4038600" cy="4525963"/>
+            <a:off x="448072" y="960121"/>
+            <a:ext cx="3957968" cy="2715578"/>
           </a:xfrm>
         </p:spPr>
         <p:txBody>
           <a:bodyPr/>
           <a:lstStyle>
             <a:lvl1pPr>
-              <a:defRPr sz="2800"/>
+              <a:defRPr sz="2400"/>
             </a:lvl1pPr>
             <a:lvl2pPr>
-              <a:defRPr sz="2400"/>
+              <a:defRPr sz="2000"/>
             </a:lvl2pPr>
             <a:lvl3pPr>
-              <a:defRPr sz="2000"/>
+              <a:defRPr sz="1700"/>
             </a:lvl3pPr>
             <a:lvl4pPr>
-              <a:defRPr sz="1800"/>
+              <a:defRPr sz="1500"/>
             </a:lvl4pPr>
             <a:lvl5pPr>
-              <a:defRPr sz="1800"/>
+              <a:defRPr sz="1500"/>
             </a:lvl5pPr>
             <a:lvl6pPr>
-              <a:defRPr sz="1800"/>
+              <a:defRPr sz="1500"/>
             </a:lvl6pPr>
             <a:lvl7pPr>
-              <a:defRPr sz="1800"/>
+              <a:defRPr sz="1500"/>
             </a:lvl7pPr>
             <a:lvl8pPr>
-              <a:defRPr sz="1800"/>
+              <a:defRPr sz="1500"/>
             </a:lvl8pPr>
             <a:lvl9pPr>
-              <a:defRPr sz="1800"/>
+              <a:defRPr sz="1500"/>
             </a:lvl9pPr>
           </a:lstStyle>
           <a:p>
@@ -1252,39 +1727,39 @@
         </p:nvSpPr>
         <p:spPr>
           <a:xfrm>
-            <a:off x="4648200" y="1600200"/>
-            <a:ext cx="4038600" cy="4525963"/>
+            <a:off x="4555398" y="960121"/>
+            <a:ext cx="3957968" cy="2715578"/>
           </a:xfrm>
         </p:spPr>
         <p:txBody>
           <a:bodyPr/>
           <a:lstStyle>
             <a:lvl1pPr>
-              <a:defRPr sz="2800"/>
+              <a:defRPr sz="2400"/>
             </a:lvl1pPr>
             <a:lvl2pPr>
-              <a:defRPr sz="2400"/>
+              <a:defRPr sz="2000"/>
             </a:lvl2pPr>
             <a:lvl3pPr>
-              <a:defRPr sz="2000"/>
+              <a:defRPr sz="1700"/>
             </a:lvl3pPr>
             <a:lvl4pPr>
-              <a:defRPr sz="1800"/>
+              <a:defRPr sz="1500"/>
             </a:lvl4pPr>
             <a:lvl5pPr>
-              <a:defRPr sz="1800"/>
+              <a:defRPr sz="1500"/>
             </a:lvl5pPr>
             <a:lvl6pPr>
-              <a:defRPr sz="1800"/>
+              <a:defRPr sz="1500"/>
             </a:lvl6pPr>
             <a:lvl7pPr>
-              <a:defRPr sz="1800"/>
+              <a:defRPr sz="1500"/>
             </a:lvl7pPr>
             <a:lvl8pPr>
-              <a:defRPr sz="1800"/>
+              <a:defRPr sz="1500"/>
             </a:lvl8pPr>
             <a:lvl9pPr>
-              <a:defRPr sz="1800"/>
+              <a:defRPr sz="1500"/>
             </a:lvl9pPr>
           </a:lstStyle>
           <a:p>
@@ -1342,7 +1817,7 @@
           <a:p>
             <a:fld id="{7043EB36-D168-6042-B445-1E6BEF1C6D80}" type="datetimeFigureOut">
               <a:rPr lang="en-US" smtClean="0"/>
-              <a:t>2/11/17</a:t>
+              <a:t>2/14/17</a:t>
             </a:fld>
             <a:endParaRPr lang="en-US"/>
           </a:p>
@@ -1459,8 +1934,8 @@
         </p:nvSpPr>
         <p:spPr>
           <a:xfrm>
-            <a:off x="457200" y="1535113"/>
-            <a:ext cx="4040188" cy="639762"/>
+            <a:off x="448073" y="921068"/>
+            <a:ext cx="3959525" cy="383857"/>
           </a:xfrm>
         </p:spPr>
         <p:txBody>
@@ -1468,39 +1943,39 @@
           <a:lstStyle>
             <a:lvl1pPr marL="0" indent="0">
               <a:buNone/>
-              <a:defRPr sz="2400" b="1"/>
+              <a:defRPr sz="2000" b="1"/>
             </a:lvl1pPr>
-            <a:lvl2pPr marL="457200" indent="0">
-              <a:buNone/>
-              <a:defRPr sz="2000" b="1"/>
+            <a:lvl2pPr marL="386654" indent="0">
+              <a:buNone/>
+              <a:defRPr sz="1700" b="1"/>
             </a:lvl2pPr>
-            <a:lvl3pPr marL="914400" indent="0">
-              <a:buNone/>
-              <a:defRPr sz="1800" b="1"/>
+            <a:lvl3pPr marL="773308" indent="0">
+              <a:buNone/>
+              <a:defRPr sz="1500" b="1"/>
             </a:lvl3pPr>
-            <a:lvl4pPr marL="1371600" indent="0">
-              <a:buNone/>
-              <a:defRPr sz="1600" b="1"/>
+            <a:lvl4pPr marL="1159962" indent="0">
+              <a:buNone/>
+              <a:defRPr sz="1400" b="1"/>
             </a:lvl4pPr>
-            <a:lvl5pPr marL="1828800" indent="0">
-              <a:buNone/>
-              <a:defRPr sz="1600" b="1"/>
+            <a:lvl5pPr marL="1546616" indent="0">
+              <a:buNone/>
+              <a:defRPr sz="1400" b="1"/>
             </a:lvl5pPr>
-            <a:lvl6pPr marL="2286000" indent="0">
-              <a:buNone/>
-              <a:defRPr sz="1600" b="1"/>
+            <a:lvl6pPr marL="1933270" indent="0">
+              <a:buNone/>
+              <a:defRPr sz="1400" b="1"/>
             </a:lvl6pPr>
-            <a:lvl7pPr marL="2743200" indent="0">
-              <a:buNone/>
-              <a:defRPr sz="1600" b="1"/>
+            <a:lvl7pPr marL="2319924" indent="0">
+              <a:buNone/>
+              <a:defRPr sz="1400" b="1"/>
             </a:lvl7pPr>
-            <a:lvl8pPr marL="3200400" indent="0">
-              <a:buNone/>
-              <a:defRPr sz="1600" b="1"/>
+            <a:lvl8pPr marL="2706578" indent="0">
+              <a:buNone/>
+              <a:defRPr sz="1400" b="1"/>
             </a:lvl8pPr>
-            <a:lvl9pPr marL="3657600" indent="0">
-              <a:buNone/>
-              <a:defRPr sz="1600" b="1"/>
+            <a:lvl9pPr marL="3093232" indent="0">
+              <a:buNone/>
+              <a:defRPr sz="1400" b="1"/>
             </a:lvl9pPr>
           </a:lstStyle>
           <a:p>
@@ -1524,39 +1999,39 @@
         </p:nvSpPr>
         <p:spPr>
           <a:xfrm>
-            <a:off x="457200" y="2174875"/>
-            <a:ext cx="4040188" cy="3951288"/>
+            <a:off x="448073" y="1304925"/>
+            <a:ext cx="3959525" cy="2370773"/>
           </a:xfrm>
         </p:spPr>
         <p:txBody>
           <a:bodyPr/>
           <a:lstStyle>
             <a:lvl1pPr>
-              <a:defRPr sz="2400"/>
+              <a:defRPr sz="2000"/>
             </a:lvl1pPr>
             <a:lvl2pPr>
-              <a:defRPr sz="2000"/>
+              <a:defRPr sz="1700"/>
             </a:lvl2pPr>
             <a:lvl3pPr>
-              <a:defRPr sz="1800"/>
+              <a:defRPr sz="1500"/>
             </a:lvl3pPr>
             <a:lvl4pPr>
-              <a:defRPr sz="1600"/>
+              <a:defRPr sz="1400"/>
             </a:lvl4pPr>
             <a:lvl5pPr>
-              <a:defRPr sz="1600"/>
+              <a:defRPr sz="1400"/>
             </a:lvl5pPr>
             <a:lvl6pPr>
-              <a:defRPr sz="1600"/>
+              <a:defRPr sz="1400"/>
             </a:lvl6pPr>
             <a:lvl7pPr>
-              <a:defRPr sz="1600"/>
+              <a:defRPr sz="1400"/>
             </a:lvl7pPr>
             <a:lvl8pPr>
-              <a:defRPr sz="1600"/>
+              <a:defRPr sz="1400"/>
             </a:lvl8pPr>
             <a:lvl9pPr>
-              <a:defRPr sz="1600"/>
+              <a:defRPr sz="1400"/>
             </a:lvl9pPr>
           </a:lstStyle>
           <a:p>
@@ -1609,8 +2084,8 @@
         </p:nvSpPr>
         <p:spPr>
           <a:xfrm>
-            <a:off x="4645025" y="1535113"/>
-            <a:ext cx="4041775" cy="639762"/>
+            <a:off x="4552287" y="921068"/>
+            <a:ext cx="3961080" cy="383857"/>
           </a:xfrm>
         </p:spPr>
         <p:txBody>
@@ -1618,39 +2093,39 @@
           <a:lstStyle>
             <a:lvl1pPr marL="0" indent="0">
               <a:buNone/>
-              <a:defRPr sz="2400" b="1"/>
+              <a:defRPr sz="2000" b="1"/>
             </a:lvl1pPr>
-            <a:lvl2pPr marL="457200" indent="0">
-              <a:buNone/>
-              <a:defRPr sz="2000" b="1"/>
+            <a:lvl2pPr marL="386654" indent="0">
+              <a:buNone/>
+              <a:defRPr sz="1700" b="1"/>
             </a:lvl2pPr>
-            <a:lvl3pPr marL="914400" indent="0">
-              <a:buNone/>
-              <a:defRPr sz="1800" b="1"/>
+            <a:lvl3pPr marL="773308" indent="0">
+              <a:buNone/>
+              <a:defRPr sz="1500" b="1"/>
             </a:lvl3pPr>
-            <a:lvl4pPr marL="1371600" indent="0">
-              <a:buNone/>
-              <a:defRPr sz="1600" b="1"/>
+            <a:lvl4pPr marL="1159962" indent="0">
+              <a:buNone/>
+              <a:defRPr sz="1400" b="1"/>
             </a:lvl4pPr>
-            <a:lvl5pPr marL="1828800" indent="0">
-              <a:buNone/>
-              <a:defRPr sz="1600" b="1"/>
+            <a:lvl5pPr marL="1546616" indent="0">
+              <a:buNone/>
+              <a:defRPr sz="1400" b="1"/>
             </a:lvl5pPr>
-            <a:lvl6pPr marL="2286000" indent="0">
-              <a:buNone/>
-              <a:defRPr sz="1600" b="1"/>
+            <a:lvl6pPr marL="1933270" indent="0">
+              <a:buNone/>
+              <a:defRPr sz="1400" b="1"/>
             </a:lvl6pPr>
-            <a:lvl7pPr marL="2743200" indent="0">
-              <a:buNone/>
-              <a:defRPr sz="1600" b="1"/>
+            <a:lvl7pPr marL="2319924" indent="0">
+              <a:buNone/>
+              <a:defRPr sz="1400" b="1"/>
             </a:lvl7pPr>
-            <a:lvl8pPr marL="3200400" indent="0">
-              <a:buNone/>
-              <a:defRPr sz="1600" b="1"/>
+            <a:lvl8pPr marL="2706578" indent="0">
+              <a:buNone/>
+              <a:defRPr sz="1400" b="1"/>
             </a:lvl8pPr>
-            <a:lvl9pPr marL="3657600" indent="0">
-              <a:buNone/>
-              <a:defRPr sz="1600" b="1"/>
+            <a:lvl9pPr marL="3093232" indent="0">
+              <a:buNone/>
+              <a:defRPr sz="1400" b="1"/>
             </a:lvl9pPr>
           </a:lstStyle>
           <a:p>
@@ -1674,39 +2149,39 @@
         </p:nvSpPr>
         <p:spPr>
           <a:xfrm>
-            <a:off x="4645025" y="2174875"/>
-            <a:ext cx="4041775" cy="3951288"/>
+            <a:off x="4552287" y="1304925"/>
+            <a:ext cx="3961080" cy="2370773"/>
           </a:xfrm>
         </p:spPr>
         <p:txBody>
           <a:bodyPr/>
           <a:lstStyle>
             <a:lvl1pPr>
-              <a:defRPr sz="2400"/>
+              <a:defRPr sz="2000"/>
             </a:lvl1pPr>
             <a:lvl2pPr>
-              <a:defRPr sz="2000"/>
+              <a:defRPr sz="1700"/>
             </a:lvl2pPr>
             <a:lvl3pPr>
-              <a:defRPr sz="1800"/>
+              <a:defRPr sz="1500"/>
             </a:lvl3pPr>
             <a:lvl4pPr>
-              <a:defRPr sz="1600"/>
+              <a:defRPr sz="1400"/>
             </a:lvl4pPr>
             <a:lvl5pPr>
-              <a:defRPr sz="1600"/>
+              <a:defRPr sz="1400"/>
             </a:lvl5pPr>
             <a:lvl6pPr>
-              <a:defRPr sz="1600"/>
+              <a:defRPr sz="1400"/>
             </a:lvl6pPr>
             <a:lvl7pPr>
-              <a:defRPr sz="1600"/>
+              <a:defRPr sz="1400"/>
             </a:lvl7pPr>
             <a:lvl8pPr>
-              <a:defRPr sz="1600"/>
+              <a:defRPr sz="1400"/>
             </a:lvl8pPr>
             <a:lvl9pPr>
-              <a:defRPr sz="1600"/>
+              <a:defRPr sz="1400"/>
             </a:lvl9pPr>
           </a:lstStyle>
           <a:p>
@@ -1764,7 +2239,7 @@
           <a:p>
             <a:fld id="{7043EB36-D168-6042-B445-1E6BEF1C6D80}" type="datetimeFigureOut">
               <a:rPr lang="en-US" smtClean="0"/>
-              <a:t>2/11/17</a:t>
+              <a:t>2/14/17</a:t>
             </a:fld>
             <a:endParaRPr lang="en-US"/>
           </a:p>
@@ -1882,7 +2357,7 @@
           <a:p>
             <a:fld id="{7043EB36-D168-6042-B445-1E6BEF1C6D80}" type="datetimeFigureOut">
               <a:rPr lang="en-US" smtClean="0"/>
-              <a:t>2/11/17</a:t>
+              <a:t>2/14/17</a:t>
             </a:fld>
             <a:endParaRPr lang="en-US"/>
           </a:p>
@@ -1977,7 +2452,7 @@
           <a:p>
             <a:fld id="{7043EB36-D168-6042-B445-1E6BEF1C6D80}" type="datetimeFigureOut">
               <a:rPr lang="en-US" smtClean="0"/>
-              <a:t>2/11/17</a:t>
+              <a:t>2/14/17</a:t>
             </a:fld>
             <a:endParaRPr lang="en-US"/>
           </a:p>
@@ -2067,15 +2542,15 @@
         </p:nvSpPr>
         <p:spPr>
           <a:xfrm>
-            <a:off x="457200" y="273050"/>
-            <a:ext cx="3008313" cy="1162050"/>
+            <a:off x="448074" y="163830"/>
+            <a:ext cx="2948251" cy="697230"/>
           </a:xfrm>
         </p:spPr>
         <p:txBody>
           <a:bodyPr anchor="b"/>
           <a:lstStyle>
             <a:lvl1pPr algn="l">
-              <a:defRPr sz="2000" b="1"/>
+              <a:defRPr sz="1700" b="1"/>
             </a:lvl1pPr>
           </a:lstStyle>
           <a:p>
@@ -2099,39 +2574,39 @@
         </p:nvSpPr>
         <p:spPr>
           <a:xfrm>
-            <a:off x="3575050" y="273050"/>
-            <a:ext cx="5111750" cy="5853113"/>
+            <a:off x="3503674" y="163831"/>
+            <a:ext cx="5009693" cy="3511868"/>
           </a:xfrm>
         </p:spPr>
         <p:txBody>
           <a:bodyPr/>
           <a:lstStyle>
             <a:lvl1pPr>
-              <a:defRPr sz="3200"/>
+              <a:defRPr sz="2700"/>
             </a:lvl1pPr>
             <a:lvl2pPr>
-              <a:defRPr sz="2800"/>
+              <a:defRPr sz="2400"/>
             </a:lvl2pPr>
             <a:lvl3pPr>
-              <a:defRPr sz="2400"/>
+              <a:defRPr sz="2000"/>
             </a:lvl3pPr>
             <a:lvl4pPr>
-              <a:defRPr sz="2000"/>
+              <a:defRPr sz="1700"/>
             </a:lvl4pPr>
             <a:lvl5pPr>
-              <a:defRPr sz="2000"/>
+              <a:defRPr sz="1700"/>
             </a:lvl5pPr>
             <a:lvl6pPr>
-              <a:defRPr sz="2000"/>
+              <a:defRPr sz="1700"/>
             </a:lvl6pPr>
             <a:lvl7pPr>
-              <a:defRPr sz="2000"/>
+              <a:defRPr sz="1700"/>
             </a:lvl7pPr>
             <a:lvl8pPr>
-              <a:defRPr sz="2000"/>
+              <a:defRPr sz="1700"/>
             </a:lvl8pPr>
             <a:lvl9pPr>
-              <a:defRPr sz="2000"/>
+              <a:defRPr sz="1700"/>
             </a:lvl9pPr>
           </a:lstStyle>
           <a:p>
@@ -2184,8 +2659,8 @@
         </p:nvSpPr>
         <p:spPr>
           <a:xfrm>
-            <a:off x="457200" y="1435100"/>
-            <a:ext cx="3008313" cy="4691063"/>
+            <a:off x="448074" y="861061"/>
+            <a:ext cx="2948251" cy="2814638"/>
           </a:xfrm>
         </p:spPr>
         <p:txBody>
@@ -2193,39 +2668,39 @@
           <a:lstStyle>
             <a:lvl1pPr marL="0" indent="0">
               <a:buNone/>
-              <a:defRPr sz="1400"/>
+              <a:defRPr sz="1200"/>
             </a:lvl1pPr>
-            <a:lvl2pPr marL="457200" indent="0">
-              <a:buNone/>
-              <a:defRPr sz="1200"/>
+            <a:lvl2pPr marL="386654" indent="0">
+              <a:buNone/>
+              <a:defRPr sz="1000"/>
             </a:lvl2pPr>
-            <a:lvl3pPr marL="914400" indent="0">
-              <a:buNone/>
-              <a:defRPr sz="1000"/>
+            <a:lvl3pPr marL="773308" indent="0">
+              <a:buNone/>
+              <a:defRPr sz="800"/>
             </a:lvl3pPr>
-            <a:lvl4pPr marL="1371600" indent="0">
-              <a:buNone/>
-              <a:defRPr sz="900"/>
+            <a:lvl4pPr marL="1159962" indent="0">
+              <a:buNone/>
+              <a:defRPr sz="800"/>
             </a:lvl4pPr>
-            <a:lvl5pPr marL="1828800" indent="0">
-              <a:buNone/>
-              <a:defRPr sz="900"/>
+            <a:lvl5pPr marL="1546616" indent="0">
+              <a:buNone/>
+              <a:defRPr sz="800"/>
             </a:lvl5pPr>
-            <a:lvl6pPr marL="2286000" indent="0">
-              <a:buNone/>
-              <a:defRPr sz="900"/>
+            <a:lvl6pPr marL="1933270" indent="0">
+              <a:buNone/>
+              <a:defRPr sz="800"/>
             </a:lvl6pPr>
-            <a:lvl7pPr marL="2743200" indent="0">
-              <a:buNone/>
-              <a:defRPr sz="900"/>
+            <a:lvl7pPr marL="2319924" indent="0">
+              <a:buNone/>
+              <a:defRPr sz="800"/>
             </a:lvl7pPr>
-            <a:lvl8pPr marL="3200400" indent="0">
-              <a:buNone/>
-              <a:defRPr sz="900"/>
+            <a:lvl8pPr marL="2706578" indent="0">
+              <a:buNone/>
+              <a:defRPr sz="800"/>
             </a:lvl8pPr>
-            <a:lvl9pPr marL="3657600" indent="0">
-              <a:buNone/>
-              <a:defRPr sz="900"/>
+            <a:lvl9pPr marL="3093232" indent="0">
+              <a:buNone/>
+              <a:defRPr sz="800"/>
             </a:lvl9pPr>
           </a:lstStyle>
           <a:p>
@@ -2254,7 +2729,7 @@
           <a:p>
             <a:fld id="{7043EB36-D168-6042-B445-1E6BEF1C6D80}" type="datetimeFigureOut">
               <a:rPr lang="en-US" smtClean="0"/>
-              <a:t>2/11/17</a:t>
+              <a:t>2/14/17</a:t>
             </a:fld>
             <a:endParaRPr lang="en-US"/>
           </a:p>
@@ -2344,15 +2819,15 @@
         </p:nvSpPr>
         <p:spPr>
           <a:xfrm>
-            <a:off x="1792288" y="4800600"/>
-            <a:ext cx="5486400" cy="566738"/>
+            <a:off x="1756505" y="2880360"/>
+            <a:ext cx="5376863" cy="340043"/>
           </a:xfrm>
         </p:spPr>
         <p:txBody>
           <a:bodyPr anchor="b"/>
           <a:lstStyle>
             <a:lvl1pPr algn="l">
-              <a:defRPr sz="2000" b="1"/>
+              <a:defRPr sz="1700" b="1"/>
             </a:lvl1pPr>
           </a:lstStyle>
           <a:p>
@@ -2376,8 +2851,8 @@
         </p:nvSpPr>
         <p:spPr>
           <a:xfrm>
-            <a:off x="1792288" y="612775"/>
-            <a:ext cx="5486400" cy="4114800"/>
+            <a:off x="1756505" y="367665"/>
+            <a:ext cx="5376863" cy="2468880"/>
           </a:xfrm>
         </p:spPr>
         <p:txBody>
@@ -2385,39 +2860,39 @@
           <a:lstStyle>
             <a:lvl1pPr marL="0" indent="0">
               <a:buNone/>
-              <a:defRPr sz="3200"/>
+              <a:defRPr sz="2700"/>
             </a:lvl1pPr>
-            <a:lvl2pPr marL="457200" indent="0">
-              <a:buNone/>
-              <a:defRPr sz="2800"/>
+            <a:lvl2pPr marL="386654" indent="0">
+              <a:buNone/>
+              <a:defRPr sz="2400"/>
             </a:lvl2pPr>
-            <a:lvl3pPr marL="914400" indent="0">
-              <a:buNone/>
-              <a:defRPr sz="2400"/>
+            <a:lvl3pPr marL="773308" indent="0">
+              <a:buNone/>
+              <a:defRPr sz="2000"/>
             </a:lvl3pPr>
-            <a:lvl4pPr marL="1371600" indent="0">
-              <a:buNone/>
-              <a:defRPr sz="2000"/>
+            <a:lvl4pPr marL="1159962" indent="0">
+              <a:buNone/>
+              <a:defRPr sz="1700"/>
             </a:lvl4pPr>
-            <a:lvl5pPr marL="1828800" indent="0">
-              <a:buNone/>
-              <a:defRPr sz="2000"/>
+            <a:lvl5pPr marL="1546616" indent="0">
+              <a:buNone/>
+              <a:defRPr sz="1700"/>
             </a:lvl5pPr>
-            <a:lvl6pPr marL="2286000" indent="0">
-              <a:buNone/>
-              <a:defRPr sz="2000"/>
+            <a:lvl6pPr marL="1933270" indent="0">
+              <a:buNone/>
+              <a:defRPr sz="1700"/>
             </a:lvl6pPr>
-            <a:lvl7pPr marL="2743200" indent="0">
-              <a:buNone/>
-              <a:defRPr sz="2000"/>
+            <a:lvl7pPr marL="2319924" indent="0">
+              <a:buNone/>
+              <a:defRPr sz="1700"/>
             </a:lvl7pPr>
-            <a:lvl8pPr marL="3200400" indent="0">
-              <a:buNone/>
-              <a:defRPr sz="2000"/>
+            <a:lvl8pPr marL="2706578" indent="0">
+              <a:buNone/>
+              <a:defRPr sz="1700"/>
             </a:lvl8pPr>
-            <a:lvl9pPr marL="3657600" indent="0">
-              <a:buNone/>
-              <a:defRPr sz="2000"/>
+            <a:lvl9pPr marL="3093232" indent="0">
+              <a:buNone/>
+              <a:defRPr sz="1700"/>
             </a:lvl9pPr>
           </a:lstStyle>
           <a:p>
@@ -2437,8 +2912,8 @@
         </p:nvSpPr>
         <p:spPr>
           <a:xfrm>
-            <a:off x="1792288" y="5367338"/>
-            <a:ext cx="5486400" cy="804862"/>
+            <a:off x="1756505" y="3220403"/>
+            <a:ext cx="5376863" cy="482918"/>
           </a:xfrm>
         </p:spPr>
         <p:txBody>
@@ -2446,39 +2921,39 @@
           <a:lstStyle>
             <a:lvl1pPr marL="0" indent="0">
               <a:buNone/>
-              <a:defRPr sz="1400"/>
+              <a:defRPr sz="1200"/>
             </a:lvl1pPr>
-            <a:lvl2pPr marL="457200" indent="0">
-              <a:buNone/>
-              <a:defRPr sz="1200"/>
+            <a:lvl2pPr marL="386654" indent="0">
+              <a:buNone/>
+              <a:defRPr sz="1000"/>
             </a:lvl2pPr>
-            <a:lvl3pPr marL="914400" indent="0">
-              <a:buNone/>
-              <a:defRPr sz="1000"/>
+            <a:lvl3pPr marL="773308" indent="0">
+              <a:buNone/>
+              <a:defRPr sz="800"/>
             </a:lvl3pPr>
-            <a:lvl4pPr marL="1371600" indent="0">
-              <a:buNone/>
-              <a:defRPr sz="900"/>
+            <a:lvl4pPr marL="1159962" indent="0">
+              <a:buNone/>
+              <a:defRPr sz="800"/>
             </a:lvl4pPr>
-            <a:lvl5pPr marL="1828800" indent="0">
-              <a:buNone/>
-              <a:defRPr sz="900"/>
+            <a:lvl5pPr marL="1546616" indent="0">
+              <a:buNone/>
+              <a:defRPr sz="800"/>
             </a:lvl5pPr>
-            <a:lvl6pPr marL="2286000" indent="0">
-              <a:buNone/>
-              <a:defRPr sz="900"/>
+            <a:lvl6pPr marL="1933270" indent="0">
+              <a:buNone/>
+              <a:defRPr sz="800"/>
             </a:lvl6pPr>
-            <a:lvl7pPr marL="2743200" indent="0">
-              <a:buNone/>
-              <a:defRPr sz="900"/>
+            <a:lvl7pPr marL="2319924" indent="0">
+              <a:buNone/>
+              <a:defRPr sz="800"/>
             </a:lvl7pPr>
-            <a:lvl8pPr marL="3200400" indent="0">
-              <a:buNone/>
-              <a:defRPr sz="900"/>
+            <a:lvl8pPr marL="2706578" indent="0">
+              <a:buNone/>
+              <a:defRPr sz="800"/>
             </a:lvl8pPr>
-            <a:lvl9pPr marL="3657600" indent="0">
-              <a:buNone/>
-              <a:defRPr sz="900"/>
+            <a:lvl9pPr marL="3093232" indent="0">
+              <a:buNone/>
+              <a:defRPr sz="800"/>
             </a:lvl9pPr>
           </a:lstStyle>
           <a:p>
@@ -2507,7 +2982,7 @@
           <a:p>
             <a:fld id="{7043EB36-D168-6042-B445-1E6BEF1C6D80}" type="datetimeFigureOut">
               <a:rPr lang="en-US" smtClean="0"/>
-              <a:t>2/11/17</a:t>
+              <a:t>2/14/17</a:t>
             </a:fld>
             <a:endParaRPr lang="en-US"/>
           </a:p>
@@ -2602,15 +3077,15 @@
         </p:nvSpPr>
         <p:spPr>
           <a:xfrm>
-            <a:off x="457200" y="274638"/>
-            <a:ext cx="8229600" cy="1143000"/>
+            <a:off x="448072" y="164783"/>
+            <a:ext cx="8065294" cy="685800"/>
           </a:xfrm>
           <a:prstGeom prst="rect">
             <a:avLst/>
           </a:prstGeom>
         </p:spPr>
         <p:txBody>
-          <a:bodyPr vert="horz" lIns="91440" tIns="45720" rIns="91440" bIns="45720" rtlCol="0" anchor="ctr">
+          <a:bodyPr vert="horz" lIns="77331" tIns="38665" rIns="77331" bIns="38665" rtlCol="0" anchor="ctr">
             <a:normAutofit/>
           </a:bodyPr>
           <a:lstStyle/>
@@ -2635,15 +3110,15 @@
         </p:nvSpPr>
         <p:spPr>
           <a:xfrm>
-            <a:off x="457200" y="1600200"/>
-            <a:ext cx="8229600" cy="4525963"/>
+            <a:off x="448072" y="960121"/>
+            <a:ext cx="8065294" cy="2715578"/>
           </a:xfrm>
           <a:prstGeom prst="rect">
             <a:avLst/>
           </a:prstGeom>
         </p:spPr>
         <p:txBody>
-          <a:bodyPr vert="horz" lIns="91440" tIns="45720" rIns="91440" bIns="45720" rtlCol="0">
+          <a:bodyPr vert="horz" lIns="77331" tIns="38665" rIns="77331" bIns="38665" rtlCol="0">
             <a:normAutofit/>
           </a:bodyPr>
           <a:lstStyle/>
@@ -2697,18 +3172,18 @@
         </p:nvSpPr>
         <p:spPr>
           <a:xfrm>
-            <a:off x="457200" y="6356350"/>
-            <a:ext cx="2133600" cy="365125"/>
+            <a:off x="448072" y="3813811"/>
+            <a:ext cx="2091002" cy="219075"/>
           </a:xfrm>
           <a:prstGeom prst="rect">
             <a:avLst/>
           </a:prstGeom>
         </p:spPr>
         <p:txBody>
-          <a:bodyPr vert="horz" lIns="91440" tIns="45720" rIns="91440" bIns="45720" rtlCol="0" anchor="ctr"/>
+          <a:bodyPr vert="horz" lIns="77331" tIns="38665" rIns="77331" bIns="38665" rtlCol="0" anchor="ctr"/>
           <a:lstStyle>
             <a:lvl1pPr algn="l">
-              <a:defRPr sz="1200">
+              <a:defRPr sz="1000">
                 <a:solidFill>
                   <a:schemeClr val="tx1">
                     <a:tint val="75000"/>
@@ -2720,7 +3195,7 @@
           <a:p>
             <a:fld id="{7043EB36-D168-6042-B445-1E6BEF1C6D80}" type="datetimeFigureOut">
               <a:rPr lang="en-US" smtClean="0"/>
-              <a:t>2/11/17</a:t>
+              <a:t>2/14/17</a:t>
             </a:fld>
             <a:endParaRPr lang="en-US"/>
           </a:p>
@@ -2738,18 +3213,18 @@
         </p:nvSpPr>
         <p:spPr>
           <a:xfrm>
-            <a:off x="3124200" y="6356350"/>
-            <a:ext cx="2895600" cy="365125"/>
+            <a:off x="3061826" y="3813811"/>
+            <a:ext cx="2837789" cy="219075"/>
           </a:xfrm>
           <a:prstGeom prst="rect">
             <a:avLst/>
           </a:prstGeom>
         </p:spPr>
         <p:txBody>
-          <a:bodyPr vert="horz" lIns="91440" tIns="45720" rIns="91440" bIns="45720" rtlCol="0" anchor="ctr"/>
+          <a:bodyPr vert="horz" lIns="77331" tIns="38665" rIns="77331" bIns="38665" rtlCol="0" anchor="ctr"/>
           <a:lstStyle>
             <a:lvl1pPr algn="ctr">
-              <a:defRPr sz="1200">
+              <a:defRPr sz="1000">
                 <a:solidFill>
                   <a:schemeClr val="tx1">
                     <a:tint val="75000"/>
@@ -2775,18 +3250,18 @@
         </p:nvSpPr>
         <p:spPr>
           <a:xfrm>
-            <a:off x="6553200" y="6356350"/>
-            <a:ext cx="2133600" cy="365125"/>
+            <a:off x="6422364" y="3813811"/>
+            <a:ext cx="2091002" cy="219075"/>
           </a:xfrm>
           <a:prstGeom prst="rect">
             <a:avLst/>
           </a:prstGeom>
         </p:spPr>
         <p:txBody>
-          <a:bodyPr vert="horz" lIns="91440" tIns="45720" rIns="91440" bIns="45720" rtlCol="0" anchor="ctr"/>
+          <a:bodyPr vert="horz" lIns="77331" tIns="38665" rIns="77331" bIns="38665" rtlCol="0" anchor="ctr"/>
           <a:lstStyle>
             <a:lvl1pPr algn="r">
-              <a:defRPr sz="1200">
+              <a:defRPr sz="1000">
                 <a:solidFill>
                   <a:schemeClr val="tx1">
                     <a:tint val="75000"/>
@@ -2827,12 +3302,12 @@
   </p:sldLayoutIdLst>
   <p:txStyles>
     <p:titleStyle>
-      <a:lvl1pPr algn="ctr" defTabSz="457200" rtl="0" eaLnBrk="1" latinLnBrk="0" hangingPunct="1">
+      <a:lvl1pPr algn="ctr" defTabSz="386654" rtl="0" eaLnBrk="1" latinLnBrk="0" hangingPunct="1">
         <a:spcBef>
           <a:spcPct val="0"/>
         </a:spcBef>
         <a:buNone/>
-        <a:defRPr sz="4400" kern="1200">
+        <a:defRPr sz="3700" kern="1200">
           <a:solidFill>
             <a:schemeClr val="tx1"/>
           </a:solidFill>
@@ -2843,13 +3318,13 @@
       </a:lvl1pPr>
     </p:titleStyle>
     <p:bodyStyle>
-      <a:lvl1pPr marL="342900" indent="-342900" algn="l" defTabSz="457200" rtl="0" eaLnBrk="1" latinLnBrk="0" hangingPunct="1">
+      <a:lvl1pPr marL="289991" indent="-289991" algn="l" defTabSz="386654" rtl="0" eaLnBrk="1" latinLnBrk="0" hangingPunct="1">
         <a:spcBef>
           <a:spcPct val="20000"/>
         </a:spcBef>
         <a:buFont typeface="Arial"/>
         <a:buChar char="•"/>
-        <a:defRPr sz="3200" kern="1200">
+        <a:defRPr sz="2700" kern="1200">
           <a:solidFill>
             <a:schemeClr val="tx1"/>
           </a:solidFill>
@@ -2858,13 +3333,13 @@
           <a:cs typeface="+mn-cs"/>
         </a:defRPr>
       </a:lvl1pPr>
-      <a:lvl2pPr marL="742950" indent="-285750" algn="l" defTabSz="457200" rtl="0" eaLnBrk="1" latinLnBrk="0" hangingPunct="1">
+      <a:lvl2pPr marL="628313" indent="-241659" algn="l" defTabSz="386654" rtl="0" eaLnBrk="1" latinLnBrk="0" hangingPunct="1">
         <a:spcBef>
           <a:spcPct val="20000"/>
         </a:spcBef>
         <a:buFont typeface="Arial"/>
         <a:buChar char="–"/>
-        <a:defRPr sz="2800" kern="1200">
+        <a:defRPr sz="2400" kern="1200">
           <a:solidFill>
             <a:schemeClr val="tx1"/>
           </a:solidFill>
@@ -2873,52 +3348,7 @@
           <a:cs typeface="+mn-cs"/>
         </a:defRPr>
       </a:lvl2pPr>
-      <a:lvl3pPr marL="1143000" indent="-228600" algn="l" defTabSz="457200" rtl="0" eaLnBrk="1" latinLnBrk="0" hangingPunct="1">
-        <a:spcBef>
-          <a:spcPct val="20000"/>
-        </a:spcBef>
-        <a:buFont typeface="Arial"/>
-        <a:buChar char="•"/>
-        <a:defRPr sz="2400" kern="1200">
-          <a:solidFill>
-            <a:schemeClr val="tx1"/>
-          </a:solidFill>
-          <a:latin typeface="+mn-lt"/>
-          <a:ea typeface="+mn-ea"/>
-          <a:cs typeface="+mn-cs"/>
-        </a:defRPr>
-      </a:lvl3pPr>
-      <a:lvl4pPr marL="1600200" indent="-228600" algn="l" defTabSz="457200" rtl="0" eaLnBrk="1" latinLnBrk="0" hangingPunct="1">
-        <a:spcBef>
-          <a:spcPct val="20000"/>
-        </a:spcBef>
-        <a:buFont typeface="Arial"/>
-        <a:buChar char="–"/>
-        <a:defRPr sz="2000" kern="1200">
-          <a:solidFill>
-            <a:schemeClr val="tx1"/>
-          </a:solidFill>
-          <a:latin typeface="+mn-lt"/>
-          <a:ea typeface="+mn-ea"/>
-          <a:cs typeface="+mn-cs"/>
-        </a:defRPr>
-      </a:lvl4pPr>
-      <a:lvl5pPr marL="2057400" indent="-228600" algn="l" defTabSz="457200" rtl="0" eaLnBrk="1" latinLnBrk="0" hangingPunct="1">
-        <a:spcBef>
-          <a:spcPct val="20000"/>
-        </a:spcBef>
-        <a:buFont typeface="Arial"/>
-        <a:buChar char="»"/>
-        <a:defRPr sz="2000" kern="1200">
-          <a:solidFill>
-            <a:schemeClr val="tx1"/>
-          </a:solidFill>
-          <a:latin typeface="+mn-lt"/>
-          <a:ea typeface="+mn-ea"/>
-          <a:cs typeface="+mn-cs"/>
-        </a:defRPr>
-      </a:lvl5pPr>
-      <a:lvl6pPr marL="2514600" indent="-228600" algn="l" defTabSz="457200" rtl="0" eaLnBrk="1" latinLnBrk="0" hangingPunct="1">
+      <a:lvl3pPr marL="966635" indent="-193327" algn="l" defTabSz="386654" rtl="0" eaLnBrk="1" latinLnBrk="0" hangingPunct="1">
         <a:spcBef>
           <a:spcPct val="20000"/>
         </a:spcBef>
@@ -2932,14 +3362,59 @@
           <a:ea typeface="+mn-ea"/>
           <a:cs typeface="+mn-cs"/>
         </a:defRPr>
-      </a:lvl6pPr>
-      <a:lvl7pPr marL="2971800" indent="-228600" algn="l" defTabSz="457200" rtl="0" eaLnBrk="1" latinLnBrk="0" hangingPunct="1">
+      </a:lvl3pPr>
+      <a:lvl4pPr marL="1353289" indent="-193327" algn="l" defTabSz="386654" rtl="0" eaLnBrk="1" latinLnBrk="0" hangingPunct="1">
+        <a:spcBef>
+          <a:spcPct val="20000"/>
+        </a:spcBef>
+        <a:buFont typeface="Arial"/>
+        <a:buChar char="–"/>
+        <a:defRPr sz="1700" kern="1200">
+          <a:solidFill>
+            <a:schemeClr val="tx1"/>
+          </a:solidFill>
+          <a:latin typeface="+mn-lt"/>
+          <a:ea typeface="+mn-ea"/>
+          <a:cs typeface="+mn-cs"/>
+        </a:defRPr>
+      </a:lvl4pPr>
+      <a:lvl5pPr marL="1739943" indent="-193327" algn="l" defTabSz="386654" rtl="0" eaLnBrk="1" latinLnBrk="0" hangingPunct="1">
+        <a:spcBef>
+          <a:spcPct val="20000"/>
+        </a:spcBef>
+        <a:buFont typeface="Arial"/>
+        <a:buChar char="»"/>
+        <a:defRPr sz="1700" kern="1200">
+          <a:solidFill>
+            <a:schemeClr val="tx1"/>
+          </a:solidFill>
+          <a:latin typeface="+mn-lt"/>
+          <a:ea typeface="+mn-ea"/>
+          <a:cs typeface="+mn-cs"/>
+        </a:defRPr>
+      </a:lvl5pPr>
+      <a:lvl6pPr marL="2126597" indent="-193327" algn="l" defTabSz="386654" rtl="0" eaLnBrk="1" latinLnBrk="0" hangingPunct="1">
         <a:spcBef>
           <a:spcPct val="20000"/>
         </a:spcBef>
         <a:buFont typeface="Arial"/>
         <a:buChar char="•"/>
-        <a:defRPr sz="2000" kern="1200">
+        <a:defRPr sz="1700" kern="1200">
+          <a:solidFill>
+            <a:schemeClr val="tx1"/>
+          </a:solidFill>
+          <a:latin typeface="+mn-lt"/>
+          <a:ea typeface="+mn-ea"/>
+          <a:cs typeface="+mn-cs"/>
+        </a:defRPr>
+      </a:lvl6pPr>
+      <a:lvl7pPr marL="2513251" indent="-193327" algn="l" defTabSz="386654" rtl="0" eaLnBrk="1" latinLnBrk="0" hangingPunct="1">
+        <a:spcBef>
+          <a:spcPct val="20000"/>
+        </a:spcBef>
+        <a:buFont typeface="Arial"/>
+        <a:buChar char="•"/>
+        <a:defRPr sz="1700" kern="1200">
           <a:solidFill>
             <a:schemeClr val="tx1"/>
           </a:solidFill>
@@ -2948,13 +3423,13 @@
           <a:cs typeface="+mn-cs"/>
         </a:defRPr>
       </a:lvl7pPr>
-      <a:lvl8pPr marL="3429000" indent="-228600" algn="l" defTabSz="457200" rtl="0" eaLnBrk="1" latinLnBrk="0" hangingPunct="1">
+      <a:lvl8pPr marL="2899905" indent="-193327" algn="l" defTabSz="386654" rtl="0" eaLnBrk="1" latinLnBrk="0" hangingPunct="1">
         <a:spcBef>
           <a:spcPct val="20000"/>
         </a:spcBef>
         <a:buFont typeface="Arial"/>
         <a:buChar char="•"/>
-        <a:defRPr sz="2000" kern="1200">
+        <a:defRPr sz="1700" kern="1200">
           <a:solidFill>
             <a:schemeClr val="tx1"/>
           </a:solidFill>
@@ -2963,13 +3438,13 @@
           <a:cs typeface="+mn-cs"/>
         </a:defRPr>
       </a:lvl8pPr>
-      <a:lvl9pPr marL="3886200" indent="-228600" algn="l" defTabSz="457200" rtl="0" eaLnBrk="1" latinLnBrk="0" hangingPunct="1">
+      <a:lvl9pPr marL="3286559" indent="-193327" algn="l" defTabSz="386654" rtl="0" eaLnBrk="1" latinLnBrk="0" hangingPunct="1">
         <a:spcBef>
           <a:spcPct val="20000"/>
         </a:spcBef>
         <a:buFont typeface="Arial"/>
         <a:buChar char="•"/>
-        <a:defRPr sz="2000" kern="1200">
+        <a:defRPr sz="1700" kern="1200">
           <a:solidFill>
             <a:schemeClr val="tx1"/>
           </a:solidFill>
@@ -2983,8 +3458,8 @@
       <a:defPPr>
         <a:defRPr lang="en-US"/>
       </a:defPPr>
-      <a:lvl1pPr marL="0" algn="l" defTabSz="457200" rtl="0" eaLnBrk="1" latinLnBrk="0" hangingPunct="1">
-        <a:defRPr sz="1800" kern="1200">
+      <a:lvl1pPr marL="0" algn="l" defTabSz="386654" rtl="0" eaLnBrk="1" latinLnBrk="0" hangingPunct="1">
+        <a:defRPr sz="1500" kern="1200">
           <a:solidFill>
             <a:schemeClr val="tx1"/>
           </a:solidFill>
@@ -2993,8 +3468,8 @@
           <a:cs typeface="+mn-cs"/>
         </a:defRPr>
       </a:lvl1pPr>
-      <a:lvl2pPr marL="457200" algn="l" defTabSz="457200" rtl="0" eaLnBrk="1" latinLnBrk="0" hangingPunct="1">
-        <a:defRPr sz="1800" kern="1200">
+      <a:lvl2pPr marL="386654" algn="l" defTabSz="386654" rtl="0" eaLnBrk="1" latinLnBrk="0" hangingPunct="1">
+        <a:defRPr sz="1500" kern="1200">
           <a:solidFill>
             <a:schemeClr val="tx1"/>
           </a:solidFill>
@@ -3003,8 +3478,8 @@
           <a:cs typeface="+mn-cs"/>
         </a:defRPr>
       </a:lvl2pPr>
-      <a:lvl3pPr marL="914400" algn="l" defTabSz="457200" rtl="0" eaLnBrk="1" latinLnBrk="0" hangingPunct="1">
-        <a:defRPr sz="1800" kern="1200">
+      <a:lvl3pPr marL="773308" algn="l" defTabSz="386654" rtl="0" eaLnBrk="1" latinLnBrk="0" hangingPunct="1">
+        <a:defRPr sz="1500" kern="1200">
           <a:solidFill>
             <a:schemeClr val="tx1"/>
           </a:solidFill>
@@ -3013,8 +3488,8 @@
           <a:cs typeface="+mn-cs"/>
         </a:defRPr>
       </a:lvl3pPr>
-      <a:lvl4pPr marL="1371600" algn="l" defTabSz="457200" rtl="0" eaLnBrk="1" latinLnBrk="0" hangingPunct="1">
-        <a:defRPr sz="1800" kern="1200">
+      <a:lvl4pPr marL="1159962" algn="l" defTabSz="386654" rtl="0" eaLnBrk="1" latinLnBrk="0" hangingPunct="1">
+        <a:defRPr sz="1500" kern="1200">
           <a:solidFill>
             <a:schemeClr val="tx1"/>
           </a:solidFill>
@@ -3023,8 +3498,8 @@
           <a:cs typeface="+mn-cs"/>
         </a:defRPr>
       </a:lvl4pPr>
-      <a:lvl5pPr marL="1828800" algn="l" defTabSz="457200" rtl="0" eaLnBrk="1" latinLnBrk="0" hangingPunct="1">
-        <a:defRPr sz="1800" kern="1200">
+      <a:lvl5pPr marL="1546616" algn="l" defTabSz="386654" rtl="0" eaLnBrk="1" latinLnBrk="0" hangingPunct="1">
+        <a:defRPr sz="1500" kern="1200">
           <a:solidFill>
             <a:schemeClr val="tx1"/>
           </a:solidFill>
@@ -3033,8 +3508,8 @@
           <a:cs typeface="+mn-cs"/>
         </a:defRPr>
       </a:lvl5pPr>
-      <a:lvl6pPr marL="2286000" algn="l" defTabSz="457200" rtl="0" eaLnBrk="1" latinLnBrk="0" hangingPunct="1">
-        <a:defRPr sz="1800" kern="1200">
+      <a:lvl6pPr marL="1933270" algn="l" defTabSz="386654" rtl="0" eaLnBrk="1" latinLnBrk="0" hangingPunct="1">
+        <a:defRPr sz="1500" kern="1200">
           <a:solidFill>
             <a:schemeClr val="tx1"/>
           </a:solidFill>
@@ -3043,8 +3518,8 @@
           <a:cs typeface="+mn-cs"/>
         </a:defRPr>
       </a:lvl6pPr>
-      <a:lvl7pPr marL="2743200" algn="l" defTabSz="457200" rtl="0" eaLnBrk="1" latinLnBrk="0" hangingPunct="1">
-        <a:defRPr sz="1800" kern="1200">
+      <a:lvl7pPr marL="2319924" algn="l" defTabSz="386654" rtl="0" eaLnBrk="1" latinLnBrk="0" hangingPunct="1">
+        <a:defRPr sz="1500" kern="1200">
           <a:solidFill>
             <a:schemeClr val="tx1"/>
           </a:solidFill>
@@ -3053,8 +3528,8 @@
           <a:cs typeface="+mn-cs"/>
         </a:defRPr>
       </a:lvl7pPr>
-      <a:lvl8pPr marL="3200400" algn="l" defTabSz="457200" rtl="0" eaLnBrk="1" latinLnBrk="0" hangingPunct="1">
-        <a:defRPr sz="1800" kern="1200">
+      <a:lvl8pPr marL="2706578" algn="l" defTabSz="386654" rtl="0" eaLnBrk="1" latinLnBrk="0" hangingPunct="1">
+        <a:defRPr sz="1500" kern="1200">
           <a:solidFill>
             <a:schemeClr val="tx1"/>
           </a:solidFill>
@@ -3063,8 +3538,8 @@
           <a:cs typeface="+mn-cs"/>
         </a:defRPr>
       </a:lvl8pPr>
-      <a:lvl9pPr marL="3657600" algn="l" defTabSz="457200" rtl="0" eaLnBrk="1" latinLnBrk="0" hangingPunct="1">
-        <a:defRPr sz="1800" kern="1200">
+      <a:lvl9pPr marL="3093232" algn="l" defTabSz="386654" rtl="0" eaLnBrk="1" latinLnBrk="0" hangingPunct="1">
+        <a:defRPr sz="1500" kern="1200">
           <a:solidFill>
             <a:schemeClr val="tx1"/>
           </a:solidFill>
@@ -3097,93 +3572,13 @@
       </p:grpSpPr>
       <p:sp>
         <p:nvSpPr>
-          <p:cNvPr id="3" name="Subtitle 2"/>
-          <p:cNvSpPr>
-            <a:spLocks noGrp="1"/>
-          </p:cNvSpPr>
-          <p:nvPr>
-            <p:ph type="subTitle" idx="1"/>
-          </p:nvPr>
+          <p:cNvPr id="26" name="TextBox 25"/>
+          <p:cNvSpPr txBox="1"/>
+          <p:nvPr/>
         </p:nvSpPr>
         <p:spPr>
           <a:xfrm>
-            <a:off x="125722" y="4899448"/>
-            <a:ext cx="9022395" cy="1752600"/>
-          </a:xfrm>
-        </p:spPr>
-        <p:txBody>
-          <a:bodyPr>
-            <a:normAutofit fontScale="92500" lnSpcReduction="10000"/>
-          </a:bodyPr>
-          <a:lstStyle/>
-          <a:p>
-            <a:pPr algn="l"/>
-            <a:r>
-              <a:rPr lang="en-US" dirty="0" smtClean="0">
-                <a:latin typeface="Times New Roman"/>
-                <a:cs typeface="Times New Roman"/>
-              </a:rPr>
-              <a:t>Deconstruction order matters. In the top row, the green tile is removed first, resulting in a polyomino that cannot be decomposed. However</a:t>
-            </a:r>
-            <a:r>
-              <a:rPr lang="en-US" smtClean="0">
-                <a:latin typeface="Times New Roman"/>
-                <a:cs typeface="Times New Roman"/>
-              </a:rPr>
-              <a:t>, if </a:t>
-            </a:r>
-            <a:r>
-              <a:rPr lang="en-US" dirty="0" smtClean="0">
-                <a:latin typeface="Times New Roman"/>
-                <a:cs typeface="Times New Roman"/>
-              </a:rPr>
-              <a:t>the bottom right tile is removed first, deconstruction is possible</a:t>
-            </a:r>
-            <a:endParaRPr lang="en-US" dirty="0">
-              <a:latin typeface="Times New Roman"/>
-              <a:cs typeface="Times New Roman"/>
-            </a:endParaRPr>
-          </a:p>
-        </p:txBody>
-      </p:sp>
-      <p:pic>
-        <p:nvPicPr>
-          <p:cNvPr id="4" name="Picture 3" descr="DeconstructionOrderMatters.pdf"/>
-          <p:cNvPicPr>
-            <a:picLocks noChangeAspect="1"/>
-          </p:cNvPicPr>
-          <p:nvPr/>
-        </p:nvPicPr>
-        <p:blipFill rotWithShape="1">
-          <a:blip r:embed="rId2">
-            <a:extLst>
-              <a:ext uri="{28A0092B-C50C-407E-A947-70E740481C1C}">
-                <a14:useLocalDpi xmlns:a14="http://schemas.microsoft.com/office/drawing/2010/main" val="0"/>
-              </a:ext>
-            </a:extLst>
-          </a:blip>
-          <a:srcRect t="51102"/>
-          <a:stretch/>
-        </p:blipFill>
-        <p:spPr>
-          <a:xfrm>
-            <a:off x="0" y="794174"/>
-            <a:ext cx="9039984" cy="1725038"/>
-          </a:xfrm>
-          <a:prstGeom prst="rect">
-            <a:avLst/>
-          </a:prstGeom>
-        </p:spPr>
-      </p:pic>
-      <p:sp>
-        <p:nvSpPr>
-          <p:cNvPr id="5" name="TextBox 4"/>
-          <p:cNvSpPr txBox="1"/>
-          <p:nvPr/>
-        </p:nvSpPr>
-        <p:spPr>
-          <a:xfrm>
-            <a:off x="125722" y="509987"/>
+            <a:off x="125722" y="952603"/>
             <a:ext cx="1995435" cy="461665"/>
           </a:xfrm>
           <a:prstGeom prst="rect">
@@ -3213,14 +3608,14 @@
       </p:sp>
       <p:sp>
         <p:nvSpPr>
-          <p:cNvPr id="6" name="TextBox 5"/>
+          <p:cNvPr id="27" name="TextBox 26"/>
           <p:cNvSpPr txBox="1"/>
           <p:nvPr/>
         </p:nvSpPr>
         <p:spPr>
           <a:xfrm>
-            <a:off x="2315745" y="509987"/>
-            <a:ext cx="2149848" cy="461665"/>
+            <a:off x="2121157" y="127000"/>
+            <a:ext cx="1916728" cy="463323"/>
           </a:xfrm>
           <a:prstGeom prst="rect">
             <a:avLst/>
@@ -3233,6 +3628,7 @@
           </a:bodyPr>
           <a:lstStyle/>
           <a:p>
+            <a:pPr algn="ctr"/>
             <a:r>
               <a:rPr lang="en-US" sz="2400" dirty="0" smtClean="0">
                 <a:latin typeface="Times New Roman"/>
@@ -3249,14 +3645,14 @@
       </p:sp>
       <p:sp>
         <p:nvSpPr>
-          <p:cNvPr id="7" name="TextBox 6"/>
+          <p:cNvPr id="29" name="TextBox 28"/>
           <p:cNvSpPr txBox="1"/>
           <p:nvPr/>
         </p:nvSpPr>
         <p:spPr>
           <a:xfrm>
-            <a:off x="4620063" y="2592150"/>
-            <a:ext cx="2134147" cy="461665"/>
+            <a:off x="4748959" y="3711508"/>
+            <a:ext cx="1752289" cy="461665"/>
           </a:xfrm>
           <a:prstGeom prst="rect">
             <a:avLst/>
@@ -3269,6 +3665,7 @@
           </a:bodyPr>
           <a:lstStyle/>
           <a:p>
+            <a:pPr algn="ctr"/>
             <a:r>
               <a:rPr lang="en-US" sz="2400" dirty="0">
                 <a:latin typeface="Times New Roman"/>
@@ -3292,14 +3689,14 @@
       </p:sp>
       <p:sp>
         <p:nvSpPr>
-          <p:cNvPr id="8" name="TextBox 7"/>
+          <p:cNvPr id="30" name="TextBox 29"/>
           <p:cNvSpPr txBox="1"/>
           <p:nvPr/>
         </p:nvSpPr>
         <p:spPr>
           <a:xfrm>
-            <a:off x="6902319" y="2592150"/>
-            <a:ext cx="2137665" cy="461665"/>
+            <a:off x="7186927" y="3711509"/>
+            <a:ext cx="1549125" cy="461665"/>
           </a:xfrm>
           <a:prstGeom prst="rect">
             <a:avLst/>
@@ -3312,6 +3709,7 @@
           </a:bodyPr>
           <a:lstStyle/>
           <a:p>
+            <a:pPr algn="ctr"/>
             <a:r>
               <a:rPr lang="en-US" sz="2400" dirty="0">
                 <a:latin typeface="Times New Roman"/>
@@ -3333,114 +3731,168 @@
           </a:p>
         </p:txBody>
       </p:sp>
+      <p:sp>
+        <p:nvSpPr>
+          <p:cNvPr id="31" name="TextBox 30"/>
+          <p:cNvSpPr txBox="1"/>
+          <p:nvPr/>
+        </p:nvSpPr>
+        <p:spPr>
+          <a:xfrm>
+            <a:off x="2241961" y="3711508"/>
+            <a:ext cx="1795924" cy="461666"/>
+          </a:xfrm>
+          <a:prstGeom prst="rect">
+            <a:avLst/>
+          </a:prstGeom>
+          <a:noFill/>
+        </p:spPr>
+        <p:txBody>
+          <a:bodyPr wrap="square" rtlCol="0">
+            <a:spAutoFit/>
+          </a:bodyPr>
+          <a:lstStyle/>
+          <a:p>
+            <a:pPr algn="ctr"/>
+            <a:r>
+              <a:rPr lang="en-US" sz="2400" dirty="0">
+                <a:latin typeface="Times New Roman"/>
+                <a:cs typeface="Times New Roman"/>
+              </a:rPr>
+              <a:t>B</a:t>
+            </a:r>
+            <a:r>
+              <a:rPr lang="en-US" sz="2400" dirty="0" smtClean="0">
+                <a:latin typeface="Times New Roman"/>
+                <a:cs typeface="Times New Roman"/>
+              </a:rPr>
+              <a:t>.1</a:t>
+            </a:r>
+            <a:endParaRPr lang="en-US" sz="2400" dirty="0">
+              <a:latin typeface="Times New Roman"/>
+              <a:cs typeface="Times New Roman"/>
+            </a:endParaRPr>
+          </a:p>
+        </p:txBody>
+      </p:sp>
+      <p:sp>
+        <p:nvSpPr>
+          <p:cNvPr id="33" name="Bent Arrow 32"/>
+          <p:cNvSpPr/>
+          <p:nvPr/>
+        </p:nvSpPr>
+        <p:spPr>
+          <a:xfrm>
+            <a:off x="1168400" y="952603"/>
+            <a:ext cx="736600" cy="461665"/>
+          </a:xfrm>
+          <a:prstGeom prst="bentArrow">
+            <a:avLst/>
+          </a:prstGeom>
+        </p:spPr>
+        <p:style>
+          <a:lnRef idx="2">
+            <a:schemeClr val="accent3">
+              <a:shade val="50000"/>
+            </a:schemeClr>
+          </a:lnRef>
+          <a:fillRef idx="1">
+            <a:schemeClr val="accent3"/>
+          </a:fillRef>
+          <a:effectRef idx="0">
+            <a:schemeClr val="accent3"/>
+          </a:effectRef>
+          <a:fontRef idx="minor">
+            <a:schemeClr val="lt1"/>
+          </a:fontRef>
+        </p:style>
+        <p:txBody>
+          <a:bodyPr rtlCol="0" anchor="ctr"/>
+          <a:lstStyle/>
+          <a:p>
+            <a:pPr algn="ctr"/>
+            <a:endParaRPr lang="en-US">
+              <a:solidFill>
+                <a:schemeClr val="tx1"/>
+              </a:solidFill>
+            </a:endParaRPr>
+          </a:p>
+        </p:txBody>
+      </p:sp>
+      <p:sp>
+        <p:nvSpPr>
+          <p:cNvPr id="34" name="Bent Arrow 33"/>
+          <p:cNvSpPr/>
+          <p:nvPr/>
+        </p:nvSpPr>
+        <p:spPr>
+          <a:xfrm flipV="1">
+            <a:off x="1168400" y="3035403"/>
+            <a:ext cx="736600" cy="461665"/>
+          </a:xfrm>
+          <a:prstGeom prst="bentArrow">
+            <a:avLst/>
+          </a:prstGeom>
+        </p:spPr>
+        <p:style>
+          <a:lnRef idx="2">
+            <a:schemeClr val="accent3">
+              <a:shade val="50000"/>
+            </a:schemeClr>
+          </a:lnRef>
+          <a:fillRef idx="1">
+            <a:schemeClr val="accent3"/>
+          </a:fillRef>
+          <a:effectRef idx="0">
+            <a:schemeClr val="accent3"/>
+          </a:effectRef>
+          <a:fontRef idx="minor">
+            <a:schemeClr val="lt1"/>
+          </a:fontRef>
+        </p:style>
+        <p:txBody>
+          <a:bodyPr rtlCol="0" anchor="ctr"/>
+          <a:lstStyle/>
+          <a:p>
+            <a:pPr algn="ctr"/>
+            <a:endParaRPr lang="en-US">
+              <a:solidFill>
+                <a:schemeClr val="tx1"/>
+              </a:solidFill>
+            </a:endParaRPr>
+          </a:p>
+        </p:txBody>
+      </p:sp>
       <p:pic>
         <p:nvPicPr>
-          <p:cNvPr id="9" name="Picture 8" descr="DeconstructionOrderMatters.pdf"/>
+          <p:cNvPr id="2" name="Picture 1" descr="DeconstructionOrderMatters.pdf"/>
           <p:cNvPicPr>
             <a:picLocks noChangeAspect="1"/>
           </p:cNvPicPr>
           <p:nvPr/>
         </p:nvPicPr>
-        <p:blipFill rotWithShape="1">
-          <a:blip r:embed="rId2">
+        <p:blipFill>
+          <a:blip r:embed="rId3">
             <a:extLst>
               <a:ext uri="{28A0092B-C50C-407E-A947-70E740481C1C}">
                 <a14:useLocalDpi xmlns:a14="http://schemas.microsoft.com/office/drawing/2010/main" val="0"/>
               </a:ext>
             </a:extLst>
           </a:blip>
-          <a:srcRect b="51102"/>
-          <a:stretch/>
+          <a:stretch>
+            <a:fillRect/>
+          </a:stretch>
         </p:blipFill>
         <p:spPr>
           <a:xfrm>
-            <a:off x="0" y="2971800"/>
-            <a:ext cx="9039984" cy="1725038"/>
+            <a:off x="24138" y="590323"/>
+            <a:ext cx="8961439" cy="3121185"/>
           </a:xfrm>
           <a:prstGeom prst="rect">
             <a:avLst/>
           </a:prstGeom>
         </p:spPr>
       </p:pic>
-      <p:sp>
-        <p:nvSpPr>
-          <p:cNvPr id="10" name="TextBox 9"/>
-          <p:cNvSpPr txBox="1"/>
-          <p:nvPr/>
-        </p:nvSpPr>
-        <p:spPr>
-          <a:xfrm>
-            <a:off x="2315745" y="2592150"/>
-            <a:ext cx="2149848" cy="461665"/>
-          </a:xfrm>
-          <a:prstGeom prst="rect">
-            <a:avLst/>
-          </a:prstGeom>
-          <a:noFill/>
-        </p:spPr>
-        <p:txBody>
-          <a:bodyPr wrap="square" rtlCol="0">
-            <a:spAutoFit/>
-          </a:bodyPr>
-          <a:lstStyle/>
-          <a:p>
-            <a:r>
-              <a:rPr lang="en-US" sz="2400" dirty="0">
-                <a:latin typeface="Times New Roman"/>
-                <a:cs typeface="Times New Roman"/>
-              </a:rPr>
-              <a:t>B</a:t>
-            </a:r>
-            <a:r>
-              <a:rPr lang="en-US" sz="2400" dirty="0" smtClean="0">
-                <a:latin typeface="Times New Roman"/>
-                <a:cs typeface="Times New Roman"/>
-              </a:rPr>
-              <a:t>.1</a:t>
-            </a:r>
-            <a:endParaRPr lang="en-US" sz="2400" dirty="0">
-              <a:latin typeface="Times New Roman"/>
-              <a:cs typeface="Times New Roman"/>
-            </a:endParaRPr>
-          </a:p>
-        </p:txBody>
-      </p:sp>
-      <p:sp>
-        <p:nvSpPr>
-          <p:cNvPr id="11" name="TextBox 10"/>
-          <p:cNvSpPr txBox="1"/>
-          <p:nvPr/>
-        </p:nvSpPr>
-        <p:spPr>
-          <a:xfrm>
-            <a:off x="125722" y="2592150"/>
-            <a:ext cx="1995435" cy="461665"/>
-          </a:xfrm>
-          <a:prstGeom prst="rect">
-            <a:avLst/>
-          </a:prstGeom>
-          <a:noFill/>
-        </p:spPr>
-        <p:txBody>
-          <a:bodyPr wrap="square" rtlCol="0">
-            <a:spAutoFit/>
-          </a:bodyPr>
-          <a:lstStyle/>
-          <a:p>
-            <a:r>
-              <a:rPr lang="en-US" sz="2400" dirty="0" smtClean="0">
-                <a:latin typeface="Times New Roman"/>
-                <a:cs typeface="Times New Roman"/>
-              </a:rPr>
-              <a:t>Initial</a:t>
-            </a:r>
-            <a:endParaRPr lang="en-US" sz="2400" dirty="0">
-              <a:latin typeface="Times New Roman"/>
-              <a:cs typeface="Times New Roman"/>
-            </a:endParaRPr>
-          </a:p>
-        </p:txBody>
-      </p:sp>
     </p:spTree>
     <p:extLst>
       <p:ext uri="{BB962C8B-B14F-4D97-AF65-F5344CB8AC3E}">
@@ -3772,4 +4224,324 @@
   </a:objectDefaults>
   <a:extraClrSchemeLst/>
 </a:theme>
+</file>
+
+<file path=ppt/theme/theme2.xml><?xml version="1.0" encoding="utf-8"?>
+<a:theme xmlns:a="http://schemas.openxmlformats.org/drawingml/2006/main" name="Office Theme">
+  <a:themeElements>
+    <a:clrScheme name="Office">
+      <a:dk1>
+        <a:sysClr val="windowText" lastClr="000000"/>
+      </a:dk1>
+      <a:lt1>
+        <a:sysClr val="window" lastClr="FFFFFF"/>
+      </a:lt1>
+      <a:dk2>
+        <a:srgbClr val="1F497D"/>
+      </a:dk2>
+      <a:lt2>
+        <a:srgbClr val="EEECE1"/>
+      </a:lt2>
+      <a:accent1>
+        <a:srgbClr val="4F81BD"/>
+      </a:accent1>
+      <a:accent2>
+        <a:srgbClr val="C0504D"/>
+      </a:accent2>
+      <a:accent3>
+        <a:srgbClr val="9BBB59"/>
+      </a:accent3>
+      <a:accent4>
+        <a:srgbClr val="8064A2"/>
+      </a:accent4>
+      <a:accent5>
+        <a:srgbClr val="4BACC6"/>
+      </a:accent5>
+      <a:accent6>
+        <a:srgbClr val="F79646"/>
+      </a:accent6>
+      <a:hlink>
+        <a:srgbClr val="0000FF"/>
+      </a:hlink>
+      <a:folHlink>
+        <a:srgbClr val="800080"/>
+      </a:folHlink>
+    </a:clrScheme>
+    <a:fontScheme name="Office">
+      <a:majorFont>
+        <a:latin typeface="Calibri"/>
+        <a:ea typeface=""/>
+        <a:cs typeface=""/>
+        <a:font script="Jpan" typeface="ＭＳ Ｐゴシック"/>
+        <a:font script="Hang" typeface="맑은 고딕"/>
+        <a:font script="Hans" typeface="宋体"/>
+        <a:font script="Hant" typeface="新細明體"/>
+        <a:font script="Arab" typeface="Times New Roman"/>
+        <a:font script="Hebr" typeface="Times New Roman"/>
+        <a:font script="Thai" typeface="Angsana New"/>
+        <a:font script="Ethi" typeface="Nyala"/>
+        <a:font script="Beng" typeface="Vrinda"/>
+        <a:font script="Gujr" typeface="Shruti"/>
+        <a:font script="Khmr" typeface="MoolBoran"/>
+        <a:font script="Knda" typeface="Tunga"/>
+        <a:font script="Guru" typeface="Raavi"/>
+        <a:font script="Cans" typeface="Euphemia"/>
+        <a:font script="Cher" typeface="Plantagenet Cherokee"/>
+        <a:font script="Yiii" typeface="Microsoft Yi Baiti"/>
+        <a:font script="Tibt" typeface="Microsoft Himalaya"/>
+        <a:font script="Thaa" typeface="MV Boli"/>
+        <a:font script="Deva" typeface="Mangal"/>
+        <a:font script="Telu" typeface="Gautami"/>
+        <a:font script="Taml" typeface="Latha"/>
+        <a:font script="Syrc" typeface="Estrangelo Edessa"/>
+        <a:font script="Orya" typeface="Kalinga"/>
+        <a:font script="Mlym" typeface="Kartika"/>
+        <a:font script="Laoo" typeface="DokChampa"/>
+        <a:font script="Sinh" typeface="Iskoola Pota"/>
+        <a:font script="Mong" typeface="Mongolian Baiti"/>
+        <a:font script="Viet" typeface="Times New Roman"/>
+        <a:font script="Uigh" typeface="Microsoft Uighur"/>
+        <a:font script="Geor" typeface="Sylfaen"/>
+      </a:majorFont>
+      <a:minorFont>
+        <a:latin typeface="Calibri"/>
+        <a:ea typeface=""/>
+        <a:cs typeface=""/>
+        <a:font script="Jpan" typeface="ＭＳ Ｐゴシック"/>
+        <a:font script="Hang" typeface="맑은 고딕"/>
+        <a:font script="Hans" typeface="宋体"/>
+        <a:font script="Hant" typeface="新細明體"/>
+        <a:font script="Arab" typeface="Arial"/>
+        <a:font script="Hebr" typeface="Arial"/>
+        <a:font script="Thai" typeface="Cordia New"/>
+        <a:font script="Ethi" typeface="Nyala"/>
+        <a:font script="Beng" typeface="Vrinda"/>
+        <a:font script="Gujr" typeface="Shruti"/>
+        <a:font script="Khmr" typeface="DaunPenh"/>
+        <a:font script="Knda" typeface="Tunga"/>
+        <a:font script="Guru" typeface="Raavi"/>
+        <a:font script="Cans" typeface="Euphemia"/>
+        <a:font script="Cher" typeface="Plantagenet Cherokee"/>
+        <a:font script="Yiii" typeface="Microsoft Yi Baiti"/>
+        <a:font script="Tibt" typeface="Microsoft Himalaya"/>
+        <a:font script="Thaa" typeface="MV Boli"/>
+        <a:font script="Deva" typeface="Mangal"/>
+        <a:font script="Telu" typeface="Gautami"/>
+        <a:font script="Taml" typeface="Latha"/>
+        <a:font script="Syrc" typeface="Estrangelo Edessa"/>
+        <a:font script="Orya" typeface="Kalinga"/>
+        <a:font script="Mlym" typeface="Kartika"/>
+        <a:font script="Laoo" typeface="DokChampa"/>
+        <a:font script="Sinh" typeface="Iskoola Pota"/>
+        <a:font script="Mong" typeface="Mongolian Baiti"/>
+        <a:font script="Viet" typeface="Arial"/>
+        <a:font script="Uigh" typeface="Microsoft Uighur"/>
+        <a:font script="Geor" typeface="Sylfaen"/>
+      </a:minorFont>
+    </a:fontScheme>
+    <a:fmtScheme name="Office">
+      <a:fillStyleLst>
+        <a:solidFill>
+          <a:schemeClr val="phClr"/>
+        </a:solidFill>
+        <a:gradFill rotWithShape="1">
+          <a:gsLst>
+            <a:gs pos="0">
+              <a:schemeClr val="phClr">
+                <a:tint val="50000"/>
+                <a:satMod val="300000"/>
+              </a:schemeClr>
+            </a:gs>
+            <a:gs pos="35000">
+              <a:schemeClr val="phClr">
+                <a:tint val="37000"/>
+                <a:satMod val="300000"/>
+              </a:schemeClr>
+            </a:gs>
+            <a:gs pos="100000">
+              <a:schemeClr val="phClr">
+                <a:tint val="15000"/>
+                <a:satMod val="350000"/>
+              </a:schemeClr>
+            </a:gs>
+          </a:gsLst>
+          <a:lin ang="16200000" scaled="1"/>
+        </a:gradFill>
+        <a:gradFill rotWithShape="1">
+          <a:gsLst>
+            <a:gs pos="0">
+              <a:schemeClr val="phClr">
+                <a:tint val="100000"/>
+                <a:shade val="100000"/>
+                <a:satMod val="130000"/>
+              </a:schemeClr>
+            </a:gs>
+            <a:gs pos="100000">
+              <a:schemeClr val="phClr">
+                <a:tint val="50000"/>
+                <a:shade val="100000"/>
+                <a:satMod val="350000"/>
+              </a:schemeClr>
+            </a:gs>
+          </a:gsLst>
+          <a:lin ang="16200000" scaled="0"/>
+        </a:gradFill>
+      </a:fillStyleLst>
+      <a:lnStyleLst>
+        <a:ln w="9525" cap="flat" cmpd="sng" algn="ctr">
+          <a:solidFill>
+            <a:schemeClr val="phClr">
+              <a:shade val="95000"/>
+              <a:satMod val="105000"/>
+            </a:schemeClr>
+          </a:solidFill>
+          <a:prstDash val="solid"/>
+        </a:ln>
+        <a:ln w="25400" cap="flat" cmpd="sng" algn="ctr">
+          <a:solidFill>
+            <a:schemeClr val="phClr"/>
+          </a:solidFill>
+          <a:prstDash val="solid"/>
+        </a:ln>
+        <a:ln w="38100" cap="flat" cmpd="sng" algn="ctr">
+          <a:solidFill>
+            <a:schemeClr val="phClr"/>
+          </a:solidFill>
+          <a:prstDash val="solid"/>
+        </a:ln>
+      </a:lnStyleLst>
+      <a:effectStyleLst>
+        <a:effectStyle>
+          <a:effectLst>
+            <a:outerShdw blurRad="40000" dist="20000" dir="5400000" rotWithShape="0">
+              <a:srgbClr val="000000">
+                <a:alpha val="38000"/>
+              </a:srgbClr>
+            </a:outerShdw>
+          </a:effectLst>
+        </a:effectStyle>
+        <a:effectStyle>
+          <a:effectLst>
+            <a:outerShdw blurRad="40000" dist="23000" dir="5400000" rotWithShape="0">
+              <a:srgbClr val="000000">
+                <a:alpha val="35000"/>
+              </a:srgbClr>
+            </a:outerShdw>
+          </a:effectLst>
+        </a:effectStyle>
+        <a:effectStyle>
+          <a:effectLst>
+            <a:outerShdw blurRad="40000" dist="23000" dir="5400000" rotWithShape="0">
+              <a:srgbClr val="000000">
+                <a:alpha val="35000"/>
+              </a:srgbClr>
+            </a:outerShdw>
+          </a:effectLst>
+          <a:scene3d>
+            <a:camera prst="orthographicFront">
+              <a:rot lat="0" lon="0" rev="0"/>
+            </a:camera>
+            <a:lightRig rig="threePt" dir="t">
+              <a:rot lat="0" lon="0" rev="1200000"/>
+            </a:lightRig>
+          </a:scene3d>
+          <a:sp3d>
+            <a:bevelT w="63500" h="25400"/>
+          </a:sp3d>
+        </a:effectStyle>
+      </a:effectStyleLst>
+      <a:bgFillStyleLst>
+        <a:solidFill>
+          <a:schemeClr val="phClr"/>
+        </a:solidFill>
+        <a:gradFill rotWithShape="1">
+          <a:gsLst>
+            <a:gs pos="0">
+              <a:schemeClr val="phClr">
+                <a:tint val="40000"/>
+                <a:satMod val="350000"/>
+              </a:schemeClr>
+            </a:gs>
+            <a:gs pos="40000">
+              <a:schemeClr val="phClr">
+                <a:tint val="45000"/>
+                <a:shade val="99000"/>
+                <a:satMod val="350000"/>
+              </a:schemeClr>
+            </a:gs>
+            <a:gs pos="100000">
+              <a:schemeClr val="phClr">
+                <a:shade val="20000"/>
+                <a:satMod val="255000"/>
+              </a:schemeClr>
+            </a:gs>
+          </a:gsLst>
+          <a:path path="circle">
+            <a:fillToRect l="50000" t="-80000" r="50000" b="180000"/>
+          </a:path>
+        </a:gradFill>
+        <a:gradFill rotWithShape="1">
+          <a:gsLst>
+            <a:gs pos="0">
+              <a:schemeClr val="phClr">
+                <a:tint val="80000"/>
+                <a:satMod val="300000"/>
+              </a:schemeClr>
+            </a:gs>
+            <a:gs pos="100000">
+              <a:schemeClr val="phClr">
+                <a:shade val="30000"/>
+                <a:satMod val="200000"/>
+              </a:schemeClr>
+            </a:gs>
+          </a:gsLst>
+          <a:path path="circle">
+            <a:fillToRect l="50000" t="50000" r="50000" b="50000"/>
+          </a:path>
+        </a:gradFill>
+      </a:bgFillStyleLst>
+    </a:fmtScheme>
+  </a:themeElements>
+  <a:objectDefaults>
+    <a:spDef>
+      <a:spPr/>
+      <a:bodyPr/>
+      <a:lstStyle/>
+      <a:style>
+        <a:lnRef idx="1">
+          <a:schemeClr val="accent1"/>
+        </a:lnRef>
+        <a:fillRef idx="3">
+          <a:schemeClr val="accent1"/>
+        </a:fillRef>
+        <a:effectRef idx="2">
+          <a:schemeClr val="accent1"/>
+        </a:effectRef>
+        <a:fontRef idx="minor">
+          <a:schemeClr val="lt1"/>
+        </a:fontRef>
+      </a:style>
+    </a:spDef>
+    <a:lnDef>
+      <a:spPr/>
+      <a:bodyPr/>
+      <a:lstStyle/>
+      <a:style>
+        <a:lnRef idx="2">
+          <a:schemeClr val="accent1"/>
+        </a:lnRef>
+        <a:fillRef idx="0">
+          <a:schemeClr val="accent1"/>
+        </a:fillRef>
+        <a:effectRef idx="1">
+          <a:schemeClr val="accent1"/>
+        </a:effectRef>
+        <a:fontRef idx="minor">
+          <a:schemeClr val="tx1"/>
+        </a:fontRef>
+      </a:style>
+    </a:lnDef>
+  </a:objectDefaults>
+  <a:extraClrSchemeLst/>
+</a:theme>
 </file>
</xml_diff>